<commit_message>
Customer churn prediction using ML
Logistic Regression, Decision Tree, random Forest, and XGBoost.
</commit_message>
<xml_diff>
--- a/Capstone2_Customer_Churn.pptx
+++ b/Capstone2_Customer_Churn.pptx
@@ -117,7 +117,7 @@
   </p:defaultTextStyle>
   <p:extLst>
     <p:ext uri="{EFAFB233-063F-42B5-8137-9DF3F51BA10A}">
-      <p15:sldGuideLst xmlns:p15="http://schemas.microsoft.com/office/powerpoint/2012/main">
+      <p15:sldGuideLst xmlns:p15="http://schemas.microsoft.com/office/powerpoint/2012/main" xmlns="">
         <p15:guide id="1" orient="horz" pos="2160">
           <p15:clr>
             <a:srgbClr val="A4A3A4"/>
@@ -324,9 +324,9 @@
           <a:p>
             <a:fld id="{7379FFAF-2492-4762-9083-78661546F363}" type="datetimeFigureOut">
               <a:rPr lang="en-GB" smtClean="0"/>
-              <a:t>17/02/2022</a:t>
+              <a:t>21/02/2022</a:t>
             </a:fld>
-            <a:endParaRPr lang="en-GB"/>
+            <a:endParaRPr lang="en-GB" dirty="0"/>
           </a:p>
         </p:txBody>
       </p:sp>
@@ -345,7 +345,7 @@
           <a:bodyPr/>
           <a:lstStyle/>
           <a:p>
-            <a:endParaRPr lang="en-GB"/>
+            <a:endParaRPr lang="en-GB" dirty="0"/>
           </a:p>
         </p:txBody>
       </p:sp>
@@ -368,7 +368,7 @@
               <a:rPr lang="en-GB" smtClean="0"/>
               <a:t>‹#›</a:t>
             </a:fld>
-            <a:endParaRPr lang="en-GB"/>
+            <a:endParaRPr lang="en-GB" dirty="0"/>
           </a:p>
         </p:txBody>
       </p:sp>
@@ -494,9 +494,9 @@
           <a:p>
             <a:fld id="{7379FFAF-2492-4762-9083-78661546F363}" type="datetimeFigureOut">
               <a:rPr lang="en-GB" smtClean="0"/>
-              <a:t>17/02/2022</a:t>
+              <a:t>21/02/2022</a:t>
             </a:fld>
-            <a:endParaRPr lang="en-GB"/>
+            <a:endParaRPr lang="en-GB" dirty="0"/>
           </a:p>
         </p:txBody>
       </p:sp>
@@ -515,7 +515,7 @@
           <a:bodyPr/>
           <a:lstStyle/>
           <a:p>
-            <a:endParaRPr lang="en-GB"/>
+            <a:endParaRPr lang="en-GB" dirty="0"/>
           </a:p>
         </p:txBody>
       </p:sp>
@@ -538,7 +538,7 @@
               <a:rPr lang="en-GB" smtClean="0"/>
               <a:t>‹#›</a:t>
             </a:fld>
-            <a:endParaRPr lang="en-GB"/>
+            <a:endParaRPr lang="en-GB" dirty="0"/>
           </a:p>
         </p:txBody>
       </p:sp>
@@ -674,9 +674,9 @@
           <a:p>
             <a:fld id="{7379FFAF-2492-4762-9083-78661546F363}" type="datetimeFigureOut">
               <a:rPr lang="en-GB" smtClean="0"/>
-              <a:t>17/02/2022</a:t>
+              <a:t>21/02/2022</a:t>
             </a:fld>
-            <a:endParaRPr lang="en-GB"/>
+            <a:endParaRPr lang="en-GB" dirty="0"/>
           </a:p>
         </p:txBody>
       </p:sp>
@@ -695,7 +695,7 @@
           <a:bodyPr/>
           <a:lstStyle/>
           <a:p>
-            <a:endParaRPr lang="en-GB"/>
+            <a:endParaRPr lang="en-GB" dirty="0"/>
           </a:p>
         </p:txBody>
       </p:sp>
@@ -718,7 +718,7 @@
               <a:rPr lang="en-GB" smtClean="0"/>
               <a:t>‹#›</a:t>
             </a:fld>
-            <a:endParaRPr lang="en-GB"/>
+            <a:endParaRPr lang="en-GB" dirty="0"/>
           </a:p>
         </p:txBody>
       </p:sp>
@@ -844,9 +844,9 @@
           <a:p>
             <a:fld id="{7379FFAF-2492-4762-9083-78661546F363}" type="datetimeFigureOut">
               <a:rPr lang="en-GB" smtClean="0"/>
-              <a:t>17/02/2022</a:t>
+              <a:t>21/02/2022</a:t>
             </a:fld>
-            <a:endParaRPr lang="en-GB"/>
+            <a:endParaRPr lang="en-GB" dirty="0"/>
           </a:p>
         </p:txBody>
       </p:sp>
@@ -865,7 +865,7 @@
           <a:bodyPr/>
           <a:lstStyle/>
           <a:p>
-            <a:endParaRPr lang="en-GB"/>
+            <a:endParaRPr lang="en-GB" dirty="0"/>
           </a:p>
         </p:txBody>
       </p:sp>
@@ -888,7 +888,7 @@
               <a:rPr lang="en-GB" smtClean="0"/>
               <a:t>‹#›</a:t>
             </a:fld>
-            <a:endParaRPr lang="en-GB"/>
+            <a:endParaRPr lang="en-GB" dirty="0"/>
           </a:p>
         </p:txBody>
       </p:sp>
@@ -1090,9 +1090,9 @@
           <a:p>
             <a:fld id="{7379FFAF-2492-4762-9083-78661546F363}" type="datetimeFigureOut">
               <a:rPr lang="en-GB" smtClean="0"/>
-              <a:t>17/02/2022</a:t>
+              <a:t>21/02/2022</a:t>
             </a:fld>
-            <a:endParaRPr lang="en-GB"/>
+            <a:endParaRPr lang="en-GB" dirty="0"/>
           </a:p>
         </p:txBody>
       </p:sp>
@@ -1111,7 +1111,7 @@
           <a:bodyPr/>
           <a:lstStyle/>
           <a:p>
-            <a:endParaRPr lang="en-GB"/>
+            <a:endParaRPr lang="en-GB" dirty="0"/>
           </a:p>
         </p:txBody>
       </p:sp>
@@ -1134,7 +1134,7 @@
               <a:rPr lang="en-GB" smtClean="0"/>
               <a:t>‹#›</a:t>
             </a:fld>
-            <a:endParaRPr lang="en-GB"/>
+            <a:endParaRPr lang="en-GB" dirty="0"/>
           </a:p>
         </p:txBody>
       </p:sp>
@@ -1378,9 +1378,9 @@
           <a:p>
             <a:fld id="{7379FFAF-2492-4762-9083-78661546F363}" type="datetimeFigureOut">
               <a:rPr lang="en-GB" smtClean="0"/>
-              <a:t>17/02/2022</a:t>
+              <a:t>21/02/2022</a:t>
             </a:fld>
-            <a:endParaRPr lang="en-GB"/>
+            <a:endParaRPr lang="en-GB" dirty="0"/>
           </a:p>
         </p:txBody>
       </p:sp>
@@ -1399,7 +1399,7 @@
           <a:bodyPr/>
           <a:lstStyle/>
           <a:p>
-            <a:endParaRPr lang="en-GB"/>
+            <a:endParaRPr lang="en-GB" dirty="0"/>
           </a:p>
         </p:txBody>
       </p:sp>
@@ -1422,7 +1422,7 @@
               <a:rPr lang="en-GB" smtClean="0"/>
               <a:t>‹#›</a:t>
             </a:fld>
-            <a:endParaRPr lang="en-GB"/>
+            <a:endParaRPr lang="en-GB" dirty="0"/>
           </a:p>
         </p:txBody>
       </p:sp>
@@ -1800,9 +1800,9 @@
           <a:p>
             <a:fld id="{7379FFAF-2492-4762-9083-78661546F363}" type="datetimeFigureOut">
               <a:rPr lang="en-GB" smtClean="0"/>
-              <a:t>17/02/2022</a:t>
+              <a:t>21/02/2022</a:t>
             </a:fld>
-            <a:endParaRPr lang="en-GB"/>
+            <a:endParaRPr lang="en-GB" dirty="0"/>
           </a:p>
         </p:txBody>
       </p:sp>
@@ -1821,7 +1821,7 @@
           <a:bodyPr/>
           <a:lstStyle/>
           <a:p>
-            <a:endParaRPr lang="en-GB"/>
+            <a:endParaRPr lang="en-GB" dirty="0"/>
           </a:p>
         </p:txBody>
       </p:sp>
@@ -1844,7 +1844,7 @@
               <a:rPr lang="en-GB" smtClean="0"/>
               <a:t>‹#›</a:t>
             </a:fld>
-            <a:endParaRPr lang="en-GB"/>
+            <a:endParaRPr lang="en-GB" dirty="0"/>
           </a:p>
         </p:txBody>
       </p:sp>
@@ -1918,9 +1918,9 @@
           <a:p>
             <a:fld id="{7379FFAF-2492-4762-9083-78661546F363}" type="datetimeFigureOut">
               <a:rPr lang="en-GB" smtClean="0"/>
-              <a:t>17/02/2022</a:t>
+              <a:t>21/02/2022</a:t>
             </a:fld>
-            <a:endParaRPr lang="en-GB"/>
+            <a:endParaRPr lang="en-GB" dirty="0"/>
           </a:p>
         </p:txBody>
       </p:sp>
@@ -1939,7 +1939,7 @@
           <a:bodyPr/>
           <a:lstStyle/>
           <a:p>
-            <a:endParaRPr lang="en-GB"/>
+            <a:endParaRPr lang="en-GB" dirty="0"/>
           </a:p>
         </p:txBody>
       </p:sp>
@@ -1962,7 +1962,7 @@
               <a:rPr lang="en-GB" smtClean="0"/>
               <a:t>‹#›</a:t>
             </a:fld>
-            <a:endParaRPr lang="en-GB"/>
+            <a:endParaRPr lang="en-GB" dirty="0"/>
           </a:p>
         </p:txBody>
       </p:sp>
@@ -2013,9 +2013,9 @@
           <a:p>
             <a:fld id="{7379FFAF-2492-4762-9083-78661546F363}" type="datetimeFigureOut">
               <a:rPr lang="en-GB" smtClean="0"/>
-              <a:t>17/02/2022</a:t>
+              <a:t>21/02/2022</a:t>
             </a:fld>
-            <a:endParaRPr lang="en-GB"/>
+            <a:endParaRPr lang="en-GB" dirty="0"/>
           </a:p>
         </p:txBody>
       </p:sp>
@@ -2034,7 +2034,7 @@
           <a:bodyPr/>
           <a:lstStyle/>
           <a:p>
-            <a:endParaRPr lang="en-GB"/>
+            <a:endParaRPr lang="en-GB" dirty="0"/>
           </a:p>
         </p:txBody>
       </p:sp>
@@ -2057,7 +2057,7 @@
               <a:rPr lang="en-GB" smtClean="0"/>
               <a:t>‹#›</a:t>
             </a:fld>
-            <a:endParaRPr lang="en-GB"/>
+            <a:endParaRPr lang="en-GB" dirty="0"/>
           </a:p>
         </p:txBody>
       </p:sp>
@@ -2290,9 +2290,9 @@
           <a:p>
             <a:fld id="{7379FFAF-2492-4762-9083-78661546F363}" type="datetimeFigureOut">
               <a:rPr lang="en-GB" smtClean="0"/>
-              <a:t>17/02/2022</a:t>
+              <a:t>21/02/2022</a:t>
             </a:fld>
-            <a:endParaRPr lang="en-GB"/>
+            <a:endParaRPr lang="en-GB" dirty="0"/>
           </a:p>
         </p:txBody>
       </p:sp>
@@ -2311,7 +2311,7 @@
           <a:bodyPr/>
           <a:lstStyle/>
           <a:p>
-            <a:endParaRPr lang="en-GB"/>
+            <a:endParaRPr lang="en-GB" dirty="0"/>
           </a:p>
         </p:txBody>
       </p:sp>
@@ -2334,7 +2334,7 @@
               <a:rPr lang="en-GB" smtClean="0"/>
               <a:t>‹#›</a:t>
             </a:fld>
-            <a:endParaRPr lang="en-GB"/>
+            <a:endParaRPr lang="en-GB" dirty="0"/>
           </a:p>
         </p:txBody>
       </p:sp>
@@ -2457,7 +2457,7 @@
             </a:lvl9pPr>
           </a:lstStyle>
           <a:p>
-            <a:endParaRPr lang="en-GB"/>
+            <a:endParaRPr lang="en-GB" dirty="0"/>
           </a:p>
         </p:txBody>
       </p:sp>
@@ -2543,9 +2543,9 @@
           <a:p>
             <a:fld id="{7379FFAF-2492-4762-9083-78661546F363}" type="datetimeFigureOut">
               <a:rPr lang="en-GB" smtClean="0"/>
-              <a:t>17/02/2022</a:t>
+              <a:t>21/02/2022</a:t>
             </a:fld>
-            <a:endParaRPr lang="en-GB"/>
+            <a:endParaRPr lang="en-GB" dirty="0"/>
           </a:p>
         </p:txBody>
       </p:sp>
@@ -2564,7 +2564,7 @@
           <a:bodyPr/>
           <a:lstStyle/>
           <a:p>
-            <a:endParaRPr lang="en-GB"/>
+            <a:endParaRPr lang="en-GB" dirty="0"/>
           </a:p>
         </p:txBody>
       </p:sp>
@@ -2587,7 +2587,7 @@
               <a:rPr lang="en-GB" smtClean="0"/>
               <a:t>‹#›</a:t>
             </a:fld>
-            <a:endParaRPr lang="en-GB"/>
+            <a:endParaRPr lang="en-GB" dirty="0"/>
           </a:p>
         </p:txBody>
       </p:sp>
@@ -2756,9 +2756,9 @@
           <a:p>
             <a:fld id="{7379FFAF-2492-4762-9083-78661546F363}" type="datetimeFigureOut">
               <a:rPr lang="en-GB" smtClean="0"/>
-              <a:t>17/02/2022</a:t>
+              <a:t>21/02/2022</a:t>
             </a:fld>
-            <a:endParaRPr lang="en-GB"/>
+            <a:endParaRPr lang="en-GB" dirty="0"/>
           </a:p>
         </p:txBody>
       </p:sp>
@@ -2795,7 +2795,7 @@
             </a:lvl1pPr>
           </a:lstStyle>
           <a:p>
-            <a:endParaRPr lang="en-GB"/>
+            <a:endParaRPr lang="en-GB" dirty="0"/>
           </a:p>
         </p:txBody>
       </p:sp>
@@ -2836,7 +2836,7 @@
               <a:rPr lang="en-GB" smtClean="0"/>
               <a:t>‹#›</a:t>
             </a:fld>
-            <a:endParaRPr lang="en-GB"/>
+            <a:endParaRPr lang="en-GB" dirty="0"/>
           </a:p>
         </p:txBody>
       </p:sp>
@@ -3245,22 +3245,13 @@
           <a:lstStyle/>
           <a:p>
             <a:r>
-              <a:rPr lang="en-US" dirty="0" err="1">
+              <a:rPr lang="en-US" dirty="0">
                 <a:solidFill>
                   <a:srgbClr val="000000"/>
                 </a:solidFill>
                 <a:latin typeface="Helvetica Neue"/>
               </a:rPr>
-              <a:t>Kaggle</a:t>
-            </a:r>
-            <a:r>
-              <a:rPr lang="en-US" dirty="0">
-                <a:solidFill>
-                  <a:srgbClr val="000000"/>
-                </a:solidFill>
-                <a:latin typeface="Helvetica Neue"/>
-              </a:rPr>
-              <a:t> competition: </a:t>
+              <a:t>Kaggle competition: </a:t>
             </a:r>
             <a:r>
               <a:rPr lang="en-US" u="sng" dirty="0">
@@ -3448,7 +3439,7 @@
           <p:cNvPr id="5" name="Picture 5" descr="Chart, bar chart&#10;&#10;Description automatically generated">
             <a:extLst>
               <a:ext uri="{FF2B5EF4-FFF2-40B4-BE49-F238E27FC236}">
-                <a16:creationId xmlns:a16="http://schemas.microsoft.com/office/drawing/2014/main" id="{A812B38C-39C0-4121-B1A9-F0349D722248}"/>
+                <a16:creationId xmlns:a16="http://schemas.microsoft.com/office/drawing/2014/main" xmlns="" id="{A812B38C-39C0-4121-B1A9-F0349D722248}"/>
               </a:ext>
             </a:extLst>
           </p:cNvPr>
@@ -3478,7 +3469,7 @@
           <p:cNvPr id="2" name="TextBox 1">
             <a:extLst>
               <a:ext uri="{FF2B5EF4-FFF2-40B4-BE49-F238E27FC236}">
-                <a16:creationId xmlns:a16="http://schemas.microsoft.com/office/drawing/2014/main" id="{43278483-4988-4B77-BC91-902DB402685F}"/>
+                <a16:creationId xmlns:a16="http://schemas.microsoft.com/office/drawing/2014/main" xmlns="" id="{43278483-4988-4B77-BC91-902DB402685F}"/>
               </a:ext>
             </a:extLst>
           </p:cNvPr>
@@ -3570,7 +3561,7 @@
           <p:cNvPr id="4" name="Connector: Elbow 3">
             <a:extLst>
               <a:ext uri="{FF2B5EF4-FFF2-40B4-BE49-F238E27FC236}">
-                <a16:creationId xmlns:a16="http://schemas.microsoft.com/office/drawing/2014/main" id="{0B43FAEE-5CB4-422E-9144-4241FB3DDEA5}"/>
+                <a16:creationId xmlns:a16="http://schemas.microsoft.com/office/drawing/2014/main" xmlns="" id="{0B43FAEE-5CB4-422E-9144-4241FB3DDEA5}"/>
               </a:ext>
             </a:extLst>
           </p:cNvPr>
@@ -3677,16 +3668,8 @@
               <a:t>Insights: </a:t>
             </a:r>
             <a:r>
-              <a:rPr lang="en-US" sz="4100" dirty="0" err="1"/>
-              <a:t>SHapley</a:t>
-            </a:r>
-            <a:r>
               <a:rPr lang="en-US" sz="4100" dirty="0"/>
-              <a:t> Additive </a:t>
-            </a:r>
-            <a:r>
-              <a:rPr lang="en-US" sz="4100" dirty="0" err="1"/>
-              <a:t>exPlanations</a:t>
+              <a:t>SHapley Additive exPlanations</a:t>
             </a:r>
             <a:endParaRPr lang="en-GB" sz="4100" dirty="0"/>
           </a:p>
@@ -3757,7 +3740,7 @@
           <p:cNvPr id="4" name="TextBox 3">
             <a:extLst>
               <a:ext uri="{FF2B5EF4-FFF2-40B4-BE49-F238E27FC236}">
-                <a16:creationId xmlns:a16="http://schemas.microsoft.com/office/drawing/2014/main" id="{64CA26B3-5B14-4EF5-A07F-4C355E756C65}"/>
+                <a16:creationId xmlns:a16="http://schemas.microsoft.com/office/drawing/2014/main" xmlns="" id="{64CA26B3-5B14-4EF5-A07F-4C355E756C65}"/>
               </a:ext>
             </a:extLst>
           </p:cNvPr>
@@ -3799,7 +3782,7 @@
           <p:cNvPr id="5" name="TextBox 4">
             <a:extLst>
               <a:ext uri="{FF2B5EF4-FFF2-40B4-BE49-F238E27FC236}">
-                <a16:creationId xmlns:a16="http://schemas.microsoft.com/office/drawing/2014/main" id="{3CE1D346-F534-4E20-A38B-BA9EC6A09D8B}"/>
+                <a16:creationId xmlns:a16="http://schemas.microsoft.com/office/drawing/2014/main" xmlns="" id="{3CE1D346-F534-4E20-A38B-BA9EC6A09D8B}"/>
               </a:ext>
             </a:extLst>
           </p:cNvPr>
@@ -3958,7 +3941,7 @@
           <p:cNvPr id="2" name="Rectangle 1">
             <a:extLst>
               <a:ext uri="{FF2B5EF4-FFF2-40B4-BE49-F238E27FC236}">
-                <a16:creationId xmlns:a16="http://schemas.microsoft.com/office/drawing/2014/main" id="{790086BF-ABAA-4420-A71C-918C09980066}"/>
+                <a16:creationId xmlns:a16="http://schemas.microsoft.com/office/drawing/2014/main" xmlns="" id="{790086BF-ABAA-4420-A71C-918C09980066}"/>
               </a:ext>
             </a:extLst>
           </p:cNvPr>
@@ -4013,6 +3996,13 @@
               </a:rPr>
               <a:t>Jan 1,2015 -</a:t>
             </a:r>
+            <a:r>
+              <a:rPr lang="en-US" dirty="0">
+                <a:latin typeface="Consolas"/>
+                <a:cs typeface="Calibri"/>
+              </a:rPr>
+              <a:t/>
+            </a:r>
             <a:br>
               <a:rPr lang="en-US" dirty="0">
                 <a:latin typeface="Consolas"/>
@@ -4081,7 +4071,7 @@
           <p:cNvPr id="8" name="Straight Arrow Connector 7">
             <a:extLst>
               <a:ext uri="{FF2B5EF4-FFF2-40B4-BE49-F238E27FC236}">
-                <a16:creationId xmlns:a16="http://schemas.microsoft.com/office/drawing/2014/main" id="{FF426C21-7005-432B-A42F-40BAD0A3F230}"/>
+                <a16:creationId xmlns:a16="http://schemas.microsoft.com/office/drawing/2014/main" xmlns="" id="{FF426C21-7005-432B-A42F-40BAD0A3F230}"/>
               </a:ext>
             </a:extLst>
           </p:cNvPr>
@@ -4124,7 +4114,7 @@
           <p:cNvPr id="9" name="TextBox 8">
             <a:extLst>
               <a:ext uri="{FF2B5EF4-FFF2-40B4-BE49-F238E27FC236}">
-                <a16:creationId xmlns:a16="http://schemas.microsoft.com/office/drawing/2014/main" id="{D0B307AE-85DA-40FF-8F42-95CCEAEF8079}"/>
+                <a16:creationId xmlns:a16="http://schemas.microsoft.com/office/drawing/2014/main" xmlns="" id="{D0B307AE-85DA-40FF-8F42-95CCEAEF8079}"/>
               </a:ext>
             </a:extLst>
           </p:cNvPr>
@@ -4177,7 +4167,7 @@
           <p:cNvPr id="11" name="Rectangle 10">
             <a:extLst>
               <a:ext uri="{FF2B5EF4-FFF2-40B4-BE49-F238E27FC236}">
-                <a16:creationId xmlns:a16="http://schemas.microsoft.com/office/drawing/2014/main" id="{D30354F1-A80D-4043-A6DF-27ADFC4B435F}"/>
+                <a16:creationId xmlns:a16="http://schemas.microsoft.com/office/drawing/2014/main" xmlns="" id="{D30354F1-A80D-4043-A6DF-27ADFC4B435F}"/>
               </a:ext>
             </a:extLst>
           </p:cNvPr>
@@ -4280,7 +4270,7 @@
           <p:cNvPr id="13" name="TextBox 12">
             <a:extLst>
               <a:ext uri="{FF2B5EF4-FFF2-40B4-BE49-F238E27FC236}">
-                <a16:creationId xmlns:a16="http://schemas.microsoft.com/office/drawing/2014/main" id="{0FA04366-06C7-4285-A3DC-130714A10C94}"/>
+                <a16:creationId xmlns:a16="http://schemas.microsoft.com/office/drawing/2014/main" xmlns="" id="{0FA04366-06C7-4285-A3DC-130714A10C94}"/>
               </a:ext>
             </a:extLst>
           </p:cNvPr>
@@ -4353,7 +4343,7 @@
           <p:cNvPr id="14" name="Straight Arrow Connector 13">
             <a:extLst>
               <a:ext uri="{FF2B5EF4-FFF2-40B4-BE49-F238E27FC236}">
-                <a16:creationId xmlns:a16="http://schemas.microsoft.com/office/drawing/2014/main" id="{C1E0B35A-65E0-4FC6-99F8-D892AF6B6D6B}"/>
+                <a16:creationId xmlns:a16="http://schemas.microsoft.com/office/drawing/2014/main" xmlns="" id="{C1E0B35A-65E0-4FC6-99F8-D892AF6B6D6B}"/>
               </a:ext>
             </a:extLst>
           </p:cNvPr>
@@ -4398,7 +4388,7 @@
           <p:cNvPr id="15" name="Rectangle 14">
             <a:extLst>
               <a:ext uri="{FF2B5EF4-FFF2-40B4-BE49-F238E27FC236}">
-                <a16:creationId xmlns:a16="http://schemas.microsoft.com/office/drawing/2014/main" id="{1F9AB04F-AE4E-4739-A315-F235D4818966}"/>
+                <a16:creationId xmlns:a16="http://schemas.microsoft.com/office/drawing/2014/main" xmlns="" id="{1F9AB04F-AE4E-4739-A315-F235D4818966}"/>
               </a:ext>
             </a:extLst>
           </p:cNvPr>
@@ -4554,21 +4544,21 @@
                 <a:gridCol w="1325250">
                   <a:extLst>
                     <a:ext uri="{9D8B030D-6E8A-4147-A177-3AD203B41FA5}">
-                      <a16:colId xmlns:a16="http://schemas.microsoft.com/office/drawing/2014/main" val="2887374772"/>
+                      <a16:colId xmlns:a16="http://schemas.microsoft.com/office/drawing/2014/main" xmlns="" val="2887374772"/>
                     </a:ext>
                   </a:extLst>
                 </a:gridCol>
                 <a:gridCol w="1278142">
                   <a:extLst>
                     <a:ext uri="{9D8B030D-6E8A-4147-A177-3AD203B41FA5}">
-                      <a16:colId xmlns:a16="http://schemas.microsoft.com/office/drawing/2014/main" val="1323901450"/>
+                      <a16:colId xmlns:a16="http://schemas.microsoft.com/office/drawing/2014/main" xmlns="" val="1323901450"/>
                     </a:ext>
                   </a:extLst>
                 </a:gridCol>
                 <a:gridCol w="1436052">
                   <a:extLst>
                     <a:ext uri="{9D8B030D-6E8A-4147-A177-3AD203B41FA5}">
-                      <a16:colId xmlns:a16="http://schemas.microsoft.com/office/drawing/2014/main" val="3825049525"/>
+                      <a16:colId xmlns:a16="http://schemas.microsoft.com/office/drawing/2014/main" xmlns="" val="3825049525"/>
                     </a:ext>
                   </a:extLst>
                 </a:gridCol>
@@ -4633,7 +4623,7 @@
                 </a:tc>
                 <a:extLst>
                   <a:ext uri="{0D108BD9-81ED-4DB2-BD59-A6C34878D82A}">
-                    <a16:rowId xmlns:a16="http://schemas.microsoft.com/office/drawing/2014/main" val="16600145"/>
+                    <a16:rowId xmlns:a16="http://schemas.microsoft.com/office/drawing/2014/main" xmlns="" val="16600145"/>
                   </a:ext>
                 </a:extLst>
               </a:tr>
@@ -4688,7 +4678,7 @@
                 </a:tc>
                 <a:extLst>
                   <a:ext uri="{0D108BD9-81ED-4DB2-BD59-A6C34878D82A}">
-                    <a16:rowId xmlns:a16="http://schemas.microsoft.com/office/drawing/2014/main" val="4160971661"/>
+                    <a16:rowId xmlns:a16="http://schemas.microsoft.com/office/drawing/2014/main" xmlns="" val="4160971661"/>
                   </a:ext>
                 </a:extLst>
               </a:tr>
@@ -4699,7 +4689,7 @@
                     <a:lstStyle/>
                     <a:p>
                       <a:r>
-                        <a:rPr lang="en-US" sz="1800" b="1" i="0" kern="1200" dirty="0" err="1">
+                        <a:rPr lang="en-US" sz="1800" b="1" i="0" kern="1200" dirty="0">
                           <a:solidFill>
                             <a:schemeClr val="dk1"/>
                           </a:solidFill>
@@ -4752,7 +4742,7 @@
                 </a:tc>
                 <a:extLst>
                   <a:ext uri="{0D108BD9-81ED-4DB2-BD59-A6C34878D82A}">
-                    <a16:rowId xmlns:a16="http://schemas.microsoft.com/office/drawing/2014/main" val="3367325280"/>
+                    <a16:rowId xmlns:a16="http://schemas.microsoft.com/office/drawing/2014/main" xmlns="" val="3367325280"/>
                   </a:ext>
                 </a:extLst>
               </a:tr>
@@ -4763,7 +4753,7 @@
                     <a:lstStyle/>
                     <a:p>
                       <a:r>
-                        <a:rPr lang="en-US" sz="1800" b="0" i="0" kern="1200" dirty="0" err="1">
+                        <a:rPr lang="en-US" sz="1800" b="0" i="0" kern="1200" dirty="0">
                           <a:solidFill>
                             <a:schemeClr val="dk1"/>
                           </a:solidFill>
@@ -4825,7 +4815,7 @@
                 </a:tc>
                 <a:extLst>
                   <a:ext uri="{0D108BD9-81ED-4DB2-BD59-A6C34878D82A}">
-                    <a16:rowId xmlns:a16="http://schemas.microsoft.com/office/drawing/2014/main" val="3604118036"/>
+                    <a16:rowId xmlns:a16="http://schemas.microsoft.com/office/drawing/2014/main" xmlns="" val="3604118036"/>
                   </a:ext>
                 </a:extLst>
               </a:tr>
@@ -4880,7 +4870,7 @@
                 </a:tc>
                 <a:extLst>
                   <a:ext uri="{0D108BD9-81ED-4DB2-BD59-A6C34878D82A}">
-                    <a16:rowId xmlns:a16="http://schemas.microsoft.com/office/drawing/2014/main" val="3259121278"/>
+                    <a16:rowId xmlns:a16="http://schemas.microsoft.com/office/drawing/2014/main" xmlns="" val="3259121278"/>
                   </a:ext>
                 </a:extLst>
               </a:tr>
@@ -4944,7 +4934,7 @@
                 </a:tc>
                 <a:extLst>
                   <a:ext uri="{0D108BD9-81ED-4DB2-BD59-A6C34878D82A}">
-                    <a16:rowId xmlns:a16="http://schemas.microsoft.com/office/drawing/2014/main" val="3670072156"/>
+                    <a16:rowId xmlns:a16="http://schemas.microsoft.com/office/drawing/2014/main" xmlns="" val="3670072156"/>
                   </a:ext>
                 </a:extLst>
               </a:tr>
@@ -5291,7 +5281,7 @@
           <p:cNvPr id="7" name="Picture 8" descr="Table&#10;&#10;Description automatically generated">
             <a:extLst>
               <a:ext uri="{FF2B5EF4-FFF2-40B4-BE49-F238E27FC236}">
-                <a16:creationId xmlns:a16="http://schemas.microsoft.com/office/drawing/2014/main" id="{E0D2398C-1C29-48AA-82A2-E059B2FBAE8F}"/>
+                <a16:creationId xmlns:a16="http://schemas.microsoft.com/office/drawing/2014/main" xmlns="" id="{E0D2398C-1C29-48AA-82A2-E059B2FBAE8F}"/>
               </a:ext>
             </a:extLst>
           </p:cNvPr>
@@ -5351,7 +5341,7 @@
           <p:cNvPr id="4" name="Picture 4" descr="Table&#10;&#10;Description automatically generated">
             <a:extLst>
               <a:ext uri="{FF2B5EF4-FFF2-40B4-BE49-F238E27FC236}">
-                <a16:creationId xmlns:a16="http://schemas.microsoft.com/office/drawing/2014/main" id="{2F01BC2E-F0C2-4E1D-B042-DE0A0A8F8E67}"/>
+                <a16:creationId xmlns:a16="http://schemas.microsoft.com/office/drawing/2014/main" xmlns="" id="{2F01BC2E-F0C2-4E1D-B042-DE0A0A8F8E67}"/>
               </a:ext>
             </a:extLst>
           </p:cNvPr>
@@ -5381,7 +5371,7 @@
           <p:cNvPr id="6" name="Title 1">
             <a:extLst>
               <a:ext uri="{FF2B5EF4-FFF2-40B4-BE49-F238E27FC236}">
-                <a16:creationId xmlns:a16="http://schemas.microsoft.com/office/drawing/2014/main" id="{72C63362-840E-4FAC-BFCF-91A142E8C0AA}"/>
+                <a16:creationId xmlns:a16="http://schemas.microsoft.com/office/drawing/2014/main" xmlns="" id="{72C63362-840E-4FAC-BFCF-91A142E8C0AA}"/>
               </a:ext>
             </a:extLst>
           </p:cNvPr>
@@ -5433,7 +5423,7 @@
           <p:cNvPr id="8" name="Picture 8" descr="Text&#10;&#10;Description automatically generated">
             <a:extLst>
               <a:ext uri="{FF2B5EF4-FFF2-40B4-BE49-F238E27FC236}">
-                <a16:creationId xmlns:a16="http://schemas.microsoft.com/office/drawing/2014/main" id="{A7300724-62EF-44F0-A904-50E66F540541}"/>
+                <a16:creationId xmlns:a16="http://schemas.microsoft.com/office/drawing/2014/main" xmlns="" id="{A7300724-62EF-44F0-A904-50E66F540541}"/>
               </a:ext>
             </a:extLst>
           </p:cNvPr>
@@ -5463,7 +5453,7 @@
           <p:cNvPr id="2" name="Picture 2" descr="Chart, line chart&#10;&#10;Description automatically generated">
             <a:extLst>
               <a:ext uri="{FF2B5EF4-FFF2-40B4-BE49-F238E27FC236}">
-                <a16:creationId xmlns:a16="http://schemas.microsoft.com/office/drawing/2014/main" id="{3896B75C-C3C0-4786-AE06-665D8A9C7825}"/>
+                <a16:creationId xmlns:a16="http://schemas.microsoft.com/office/drawing/2014/main" xmlns="" id="{3896B75C-C3C0-4786-AE06-665D8A9C7825}"/>
               </a:ext>
             </a:extLst>
           </p:cNvPr>
@@ -5493,7 +5483,7 @@
           <p:cNvPr id="3" name="Picture 4" descr="Chart&#10;&#10;Description automatically generated">
             <a:extLst>
               <a:ext uri="{FF2B5EF4-FFF2-40B4-BE49-F238E27FC236}">
-                <a16:creationId xmlns:a16="http://schemas.microsoft.com/office/drawing/2014/main" id="{E29132E9-3F53-4093-BD03-6C2C2F08CBE1}"/>
+                <a16:creationId xmlns:a16="http://schemas.microsoft.com/office/drawing/2014/main" xmlns="" id="{E29132E9-3F53-4093-BD03-6C2C2F08CBE1}"/>
               </a:ext>
             </a:extLst>
           </p:cNvPr>
@@ -5523,7 +5513,7 @@
           <p:cNvPr id="5" name="TextBox 4">
             <a:extLst>
               <a:ext uri="{FF2B5EF4-FFF2-40B4-BE49-F238E27FC236}">
-                <a16:creationId xmlns:a16="http://schemas.microsoft.com/office/drawing/2014/main" id="{FA448F03-2D31-40E7-BAE2-18EDAF8697BA}"/>
+                <a16:creationId xmlns:a16="http://schemas.microsoft.com/office/drawing/2014/main" xmlns="" id="{FA448F03-2D31-40E7-BAE2-18EDAF8697BA}"/>
               </a:ext>
             </a:extLst>
           </p:cNvPr>
@@ -5561,7 +5551,6 @@
               <a:rPr lang="en-US" dirty="0"/>
               <a:t> &amp; accuracy</a:t>
             </a:r>
-            <a:endParaRPr lang="en-US"/>
           </a:p>
           <a:p>
             <a:pPr algn="ctr"/>
@@ -5604,9 +5593,6 @@
               </a:rPr>
               <a:t>class weight lowers</a:t>
             </a:r>
-            <a:endParaRPr lang="en-US">
-              <a:cs typeface="Calibri"/>
-            </a:endParaRPr>
           </a:p>
           <a:p>
             <a:pPr algn="ctr"/>
@@ -5888,7 +5874,7 @@
           <p:cNvPr id="2" name="Rectangle 1">
             <a:extLst>
               <a:ext uri="{FF2B5EF4-FFF2-40B4-BE49-F238E27FC236}">
-                <a16:creationId xmlns:a16="http://schemas.microsoft.com/office/drawing/2014/main" id="{D8683C89-1CEF-461C-A320-D2234010D288}"/>
+                <a16:creationId xmlns:a16="http://schemas.microsoft.com/office/drawing/2014/main" xmlns="" id="{D8683C89-1CEF-461C-A320-D2234010D288}"/>
               </a:ext>
             </a:extLst>
           </p:cNvPr>
@@ -5977,22 +5963,13 @@
           <a:p>
             <a:pPr algn="ctr"/>
             <a:r>
-              <a:rPr lang="en-US" sz="1600" dirty="0" err="1">
+              <a:rPr lang="en-US" sz="1600" dirty="0">
                 <a:solidFill>
                   <a:schemeClr val="tx1"/>
                 </a:solidFill>
                 <a:cs typeface="Calibri"/>
               </a:rPr>
-              <a:t>gini</a:t>
-            </a:r>
-            <a:r>
-              <a:rPr lang="en-US" sz="1600" dirty="0">
-                <a:solidFill>
-                  <a:schemeClr val="tx1"/>
-                </a:solidFill>
-                <a:cs typeface="Calibri"/>
-              </a:rPr>
-              <a:t> = 0.145</a:t>
+              <a:t>gini = 0.145</a:t>
             </a:r>
           </a:p>
           <a:p>
@@ -6038,7 +6015,7 @@
           <p:cNvPr id="3" name="Straight Arrow Connector 2">
             <a:extLst>
               <a:ext uri="{FF2B5EF4-FFF2-40B4-BE49-F238E27FC236}">
-                <a16:creationId xmlns:a16="http://schemas.microsoft.com/office/drawing/2014/main" id="{83677FB1-F242-4151-9F7C-65EE01A2B0E4}"/>
+                <a16:creationId xmlns:a16="http://schemas.microsoft.com/office/drawing/2014/main" xmlns="" id="{83677FB1-F242-4151-9F7C-65EE01A2B0E4}"/>
               </a:ext>
             </a:extLst>
           </p:cNvPr>
@@ -6080,7 +6057,7 @@
           <p:cNvPr id="7" name="TextBox 6">
             <a:extLst>
               <a:ext uri="{FF2B5EF4-FFF2-40B4-BE49-F238E27FC236}">
-                <a16:creationId xmlns:a16="http://schemas.microsoft.com/office/drawing/2014/main" id="{ABCF9BDA-7C46-4CA1-A8D9-AEC9814EF09C}"/>
+                <a16:creationId xmlns:a16="http://schemas.microsoft.com/office/drawing/2014/main" xmlns="" id="{ABCF9BDA-7C46-4CA1-A8D9-AEC9814EF09C}"/>
               </a:ext>
             </a:extLst>
           </p:cNvPr>
@@ -6119,7 +6096,7 @@
           <p:cNvPr id="8" name="Straight Arrow Connector 7">
             <a:extLst>
               <a:ext uri="{FF2B5EF4-FFF2-40B4-BE49-F238E27FC236}">
-                <a16:creationId xmlns:a16="http://schemas.microsoft.com/office/drawing/2014/main" id="{8003D646-983D-487B-913D-BC8E28CBD56C}"/>
+                <a16:creationId xmlns:a16="http://schemas.microsoft.com/office/drawing/2014/main" xmlns="" id="{8003D646-983D-487B-913D-BC8E28CBD56C}"/>
               </a:ext>
             </a:extLst>
           </p:cNvPr>
@@ -6161,7 +6138,7 @@
           <p:cNvPr id="9" name="TextBox 8">
             <a:extLst>
               <a:ext uri="{FF2B5EF4-FFF2-40B4-BE49-F238E27FC236}">
-                <a16:creationId xmlns:a16="http://schemas.microsoft.com/office/drawing/2014/main" id="{83E6BBEA-904D-45FF-8AD1-1B7099A5A70F}"/>
+                <a16:creationId xmlns:a16="http://schemas.microsoft.com/office/drawing/2014/main" xmlns="" id="{83E6BBEA-904D-45FF-8AD1-1B7099A5A70F}"/>
               </a:ext>
             </a:extLst>
           </p:cNvPr>
@@ -6200,7 +6177,7 @@
           <p:cNvPr id="10" name="Rectangle 9">
             <a:extLst>
               <a:ext uri="{FF2B5EF4-FFF2-40B4-BE49-F238E27FC236}">
-                <a16:creationId xmlns:a16="http://schemas.microsoft.com/office/drawing/2014/main" id="{65BAC57E-FD87-4A80-88AB-43B5486E8E6E}"/>
+                <a16:creationId xmlns:a16="http://schemas.microsoft.com/office/drawing/2014/main" xmlns="" id="{65BAC57E-FD87-4A80-88AB-43B5486E8E6E}"/>
               </a:ext>
             </a:extLst>
           </p:cNvPr>
@@ -6296,22 +6273,13 @@
           <a:p>
             <a:pPr algn="ctr"/>
             <a:r>
-              <a:rPr lang="en-US" sz="1600" dirty="0" err="1">
+              <a:rPr lang="en-US" sz="1600" dirty="0">
                 <a:solidFill>
                   <a:schemeClr val="tx1"/>
                 </a:solidFill>
                 <a:cs typeface="Calibri"/>
               </a:rPr>
-              <a:t>gini</a:t>
-            </a:r>
-            <a:r>
-              <a:rPr lang="en-US" sz="1600" dirty="0">
-                <a:solidFill>
-                  <a:schemeClr val="tx1"/>
-                </a:solidFill>
-                <a:cs typeface="Calibri"/>
-              </a:rPr>
-              <a:t> = 0.427</a:t>
+              <a:t>gini = 0.427</a:t>
             </a:r>
             <a:endParaRPr lang="en-US" dirty="0">
               <a:solidFill>
@@ -6372,7 +6340,7 @@
           <p:cNvPr id="11" name="Rectangle 10">
             <a:extLst>
               <a:ext uri="{FF2B5EF4-FFF2-40B4-BE49-F238E27FC236}">
-                <a16:creationId xmlns:a16="http://schemas.microsoft.com/office/drawing/2014/main" id="{9E287102-0063-4843-BEA8-EE5689972D8E}"/>
+                <a16:creationId xmlns:a16="http://schemas.microsoft.com/office/drawing/2014/main" xmlns="" id="{9E287102-0063-4843-BEA8-EE5689972D8E}"/>
               </a:ext>
             </a:extLst>
           </p:cNvPr>
@@ -6447,22 +6415,13 @@
               </a:rPr>
             </a:br>
             <a:r>
-              <a:rPr lang="en-US" sz="1600" dirty="0" err="1">
+              <a:rPr lang="en-US" sz="1600" dirty="0">
                 <a:solidFill>
                   <a:schemeClr val="tx1"/>
                 </a:solidFill>
                 <a:cs typeface="Calibri"/>
               </a:rPr>
-              <a:t>gini</a:t>
-            </a:r>
-            <a:r>
-              <a:rPr lang="en-US" sz="1600" dirty="0">
-                <a:solidFill>
-                  <a:schemeClr val="tx1"/>
-                </a:solidFill>
-                <a:cs typeface="Calibri"/>
-              </a:rPr>
-              <a:t> = 0.129</a:t>
+              <a:t>gini = 0.129</a:t>
             </a:r>
           </a:p>
           <a:p>
@@ -6517,7 +6476,7 @@
           <p:cNvPr id="17" name="Group 16">
             <a:extLst>
               <a:ext uri="{FF2B5EF4-FFF2-40B4-BE49-F238E27FC236}">
-                <a16:creationId xmlns:a16="http://schemas.microsoft.com/office/drawing/2014/main" id="{CA8101C9-5B7C-4954-99A6-07A13D960BF3}"/>
+                <a16:creationId xmlns:a16="http://schemas.microsoft.com/office/drawing/2014/main" xmlns="" id="{CA8101C9-5B7C-4954-99A6-07A13D960BF3}"/>
               </a:ext>
             </a:extLst>
           </p:cNvPr>
@@ -6537,7 +6496,7 @@
             <p:cNvPr id="12" name="Picture 12" descr="Chart&#10;&#10;Description automatically generated">
               <a:extLst>
                 <a:ext uri="{FF2B5EF4-FFF2-40B4-BE49-F238E27FC236}">
-                  <a16:creationId xmlns:a16="http://schemas.microsoft.com/office/drawing/2014/main" id="{9139B2E2-17BC-4B8D-98FB-624B5E8A240D}"/>
+                  <a16:creationId xmlns:a16="http://schemas.microsoft.com/office/drawing/2014/main" xmlns="" id="{9139B2E2-17BC-4B8D-98FB-624B5E8A240D}"/>
                 </a:ext>
               </a:extLst>
             </p:cNvPr>
@@ -6567,7 +6526,7 @@
             <p:cNvPr id="13" name="TextBox 12">
               <a:extLst>
                 <a:ext uri="{FF2B5EF4-FFF2-40B4-BE49-F238E27FC236}">
-                  <a16:creationId xmlns:a16="http://schemas.microsoft.com/office/drawing/2014/main" id="{327DA126-2319-47D3-976B-D2B1D0137206}"/>
+                  <a16:creationId xmlns:a16="http://schemas.microsoft.com/office/drawing/2014/main" xmlns="" id="{327DA126-2319-47D3-976B-D2B1D0137206}"/>
                 </a:ext>
               </a:extLst>
             </p:cNvPr>
@@ -6676,7 +6635,7 @@
           <p:cNvPr id="5" name="TextBox 4">
             <a:extLst>
               <a:ext uri="{FF2B5EF4-FFF2-40B4-BE49-F238E27FC236}">
-                <a16:creationId xmlns:a16="http://schemas.microsoft.com/office/drawing/2014/main" id="{7E50F4D3-5D78-4ED9-B635-43CCED4EEC3D}"/>
+                <a16:creationId xmlns:a16="http://schemas.microsoft.com/office/drawing/2014/main" xmlns="" id="{7E50F4D3-5D78-4ED9-B635-43CCED4EEC3D}"/>
               </a:ext>
             </a:extLst>
           </p:cNvPr>
@@ -6714,7 +6673,7 @@
           <p:cNvPr id="19" name="Group 18">
             <a:extLst>
               <a:ext uri="{FF2B5EF4-FFF2-40B4-BE49-F238E27FC236}">
-                <a16:creationId xmlns:a16="http://schemas.microsoft.com/office/drawing/2014/main" id="{9D78A076-AA7F-40D5-95DB-CAF4AA4D90F8}"/>
+                <a16:creationId xmlns:a16="http://schemas.microsoft.com/office/drawing/2014/main" xmlns="" id="{9D78A076-AA7F-40D5-95DB-CAF4AA4D90F8}"/>
               </a:ext>
             </a:extLst>
           </p:cNvPr>
@@ -6734,7 +6693,7 @@
             <p:cNvPr id="15" name="TextBox 14">
               <a:extLst>
                 <a:ext uri="{FF2B5EF4-FFF2-40B4-BE49-F238E27FC236}">
-                  <a16:creationId xmlns:a16="http://schemas.microsoft.com/office/drawing/2014/main" id="{5C3CED64-B661-4291-8127-F2857D7C0747}"/>
+                  <a16:creationId xmlns:a16="http://schemas.microsoft.com/office/drawing/2014/main" xmlns="" id="{5C3CED64-B661-4291-8127-F2857D7C0747}"/>
                 </a:ext>
               </a:extLst>
             </p:cNvPr>
@@ -6770,38 +6729,59 @@
                   <a:ea typeface="+mn-lt"/>
                   <a:cs typeface="+mn-lt"/>
                 </a:rPr>
-                <a:t>1 – p</a:t>
+                <a:t>1 – </a:t>
               </a:r>
               <a:r>
-                <a:rPr lang="en-US" baseline="-25000" dirty="0">
+                <a:rPr lang="en-US" dirty="0" smtClean="0">
+                  <a:ea typeface="+mn-lt"/>
+                  <a:cs typeface="+mn-lt"/>
+                </a:rPr>
+                <a:t>p</a:t>
+              </a:r>
+              <a:r>
+                <a:rPr lang="en-US" baseline="-25000" dirty="0" smtClean="0">
+                  <a:ea typeface="+mn-lt"/>
+                  <a:cs typeface="+mn-lt"/>
+                </a:rPr>
+                <a:t>0</a:t>
+              </a:r>
+              <a:r>
+                <a:rPr lang="en-US" baseline="30000" dirty="0" smtClean="0">
+                  <a:ea typeface="+mn-lt"/>
+                  <a:cs typeface="+mn-lt"/>
+                </a:rPr>
+                <a:t>2</a:t>
+              </a:r>
+              <a:r>
+                <a:rPr lang="en-US" dirty="0" smtClean="0">
+                  <a:ea typeface="+mn-lt"/>
+                  <a:cs typeface="+mn-lt"/>
+                </a:rPr>
+                <a:t> </a:t>
+              </a:r>
+              <a:r>
+                <a:rPr lang="en-US" dirty="0">
+                  <a:ea typeface="+mn-lt"/>
+                  <a:cs typeface="+mn-lt"/>
+                </a:rPr>
+                <a:t>– </a:t>
+              </a:r>
+              <a:r>
+                <a:rPr lang="en-US" dirty="0" smtClean="0">
+                  <a:ea typeface="+mn-lt"/>
+                  <a:cs typeface="+mn-lt"/>
+                </a:rPr>
+                <a:t>p</a:t>
+              </a:r>
+              <a:r>
+                <a:rPr lang="en-US" baseline="-25000" dirty="0" smtClean="0">
                   <a:ea typeface="+mn-lt"/>
                   <a:cs typeface="+mn-lt"/>
                 </a:rPr>
                 <a:t>1</a:t>
               </a:r>
               <a:r>
-                <a:rPr lang="en-US" baseline="30000" dirty="0">
-                  <a:ea typeface="+mn-lt"/>
-                  <a:cs typeface="+mn-lt"/>
-                </a:rPr>
-                <a:t>2</a:t>
-              </a:r>
-              <a:r>
-                <a:rPr lang="en-US" dirty="0">
-                  <a:ea typeface="+mn-lt"/>
-                  <a:cs typeface="+mn-lt"/>
-                </a:rPr>
-                <a:t> – p</a:t>
-              </a:r>
-              <a:r>
-                <a:rPr lang="en-US" baseline="-25000" dirty="0">
-                  <a:ea typeface="+mn-lt"/>
-                  <a:cs typeface="+mn-lt"/>
-                </a:rPr>
-                <a:t>2</a:t>
-              </a:r>
-              <a:r>
-                <a:rPr lang="en-US" baseline="30000" dirty="0">
+                <a:rPr lang="en-US" baseline="30000" dirty="0" smtClean="0">
                   <a:ea typeface="+mn-lt"/>
                   <a:cs typeface="+mn-lt"/>
                 </a:rPr>
@@ -6818,7 +6798,7 @@
             <p:cNvPr id="14" name="Picture 18" descr="Chart&#10;&#10;Description automatically generated">
               <a:extLst>
                 <a:ext uri="{FF2B5EF4-FFF2-40B4-BE49-F238E27FC236}">
-                  <a16:creationId xmlns:a16="http://schemas.microsoft.com/office/drawing/2014/main" id="{4B7FF3BF-A0F2-48D2-B636-EF6F3253A0FB}"/>
+                  <a16:creationId xmlns:a16="http://schemas.microsoft.com/office/drawing/2014/main" xmlns="" id="{4B7FF3BF-A0F2-48D2-B636-EF6F3253A0FB}"/>
                 </a:ext>
               </a:extLst>
             </p:cNvPr>
@@ -6849,7 +6829,7 @@
           <p:cNvPr id="20" name="TextBox 19">
             <a:extLst>
               <a:ext uri="{FF2B5EF4-FFF2-40B4-BE49-F238E27FC236}">
-                <a16:creationId xmlns:a16="http://schemas.microsoft.com/office/drawing/2014/main" id="{895EA34B-E82A-4CFC-A8EB-6AE182CC598F}"/>
+                <a16:creationId xmlns:a16="http://schemas.microsoft.com/office/drawing/2014/main" xmlns="" id="{895EA34B-E82A-4CFC-A8EB-6AE182CC598F}"/>
               </a:ext>
             </a:extLst>
           </p:cNvPr>
@@ -6890,7 +6870,7 @@
           <p:cNvPr id="18" name="Table 20">
             <a:extLst>
               <a:ext uri="{FF2B5EF4-FFF2-40B4-BE49-F238E27FC236}">
-                <a16:creationId xmlns:a16="http://schemas.microsoft.com/office/drawing/2014/main" id="{7E198AA3-3EAE-4804-811D-55552243F550}"/>
+                <a16:creationId xmlns:a16="http://schemas.microsoft.com/office/drawing/2014/main" xmlns="" id="{7E198AA3-3EAE-4804-811D-55552243F550}"/>
               </a:ext>
             </a:extLst>
           </p:cNvPr>
@@ -6919,42 +6899,42 @@
                 <a:gridCol w="543361">
                   <a:extLst>
                     <a:ext uri="{9D8B030D-6E8A-4147-A177-3AD203B41FA5}">
-                      <a16:colId xmlns:a16="http://schemas.microsoft.com/office/drawing/2014/main" val="1992074961"/>
+                      <a16:colId xmlns:a16="http://schemas.microsoft.com/office/drawing/2014/main" xmlns="" val="1992074961"/>
                     </a:ext>
                   </a:extLst>
                 </a:gridCol>
                 <a:gridCol w="543361">
                   <a:extLst>
                     <a:ext uri="{9D8B030D-6E8A-4147-A177-3AD203B41FA5}">
-                      <a16:colId xmlns:a16="http://schemas.microsoft.com/office/drawing/2014/main" val="1423289829"/>
+                      <a16:colId xmlns:a16="http://schemas.microsoft.com/office/drawing/2014/main" xmlns="" val="1423289829"/>
                     </a:ext>
                   </a:extLst>
                 </a:gridCol>
                 <a:gridCol w="543361">
                   <a:extLst>
                     <a:ext uri="{9D8B030D-6E8A-4147-A177-3AD203B41FA5}">
-                      <a16:colId xmlns:a16="http://schemas.microsoft.com/office/drawing/2014/main" val="3283149630"/>
+                      <a16:colId xmlns:a16="http://schemas.microsoft.com/office/drawing/2014/main" xmlns="" val="3283149630"/>
                     </a:ext>
                   </a:extLst>
                 </a:gridCol>
                 <a:gridCol w="543361">
                   <a:extLst>
                     <a:ext uri="{9D8B030D-6E8A-4147-A177-3AD203B41FA5}">
-                      <a16:colId xmlns:a16="http://schemas.microsoft.com/office/drawing/2014/main" val="3225711273"/>
+                      <a16:colId xmlns:a16="http://schemas.microsoft.com/office/drawing/2014/main" xmlns="" val="3225711273"/>
                     </a:ext>
                   </a:extLst>
                 </a:gridCol>
                 <a:gridCol w="543361">
                   <a:extLst>
                     <a:ext uri="{9D8B030D-6E8A-4147-A177-3AD203B41FA5}">
-                      <a16:colId xmlns:a16="http://schemas.microsoft.com/office/drawing/2014/main" val="3793872676"/>
+                      <a16:colId xmlns:a16="http://schemas.microsoft.com/office/drawing/2014/main" xmlns="" val="3793872676"/>
                     </a:ext>
                   </a:extLst>
                 </a:gridCol>
                 <a:gridCol w="543361">
                   <a:extLst>
                     <a:ext uri="{9D8B030D-6E8A-4147-A177-3AD203B41FA5}">
-                      <a16:colId xmlns:a16="http://schemas.microsoft.com/office/drawing/2014/main" val="2205424592"/>
+                      <a16:colId xmlns:a16="http://schemas.microsoft.com/office/drawing/2014/main" xmlns="" val="2205424592"/>
                     </a:ext>
                   </a:extLst>
                 </a:gridCol>
@@ -7064,7 +7044,7 @@
                 </a:tc>
                 <a:extLst>
                   <a:ext uri="{0D108BD9-81ED-4DB2-BD59-A6C34878D82A}">
-                    <a16:rowId xmlns:a16="http://schemas.microsoft.com/office/drawing/2014/main" val="444405313"/>
+                    <a16:rowId xmlns:a16="http://schemas.microsoft.com/office/drawing/2014/main" xmlns="" val="444405313"/>
                   </a:ext>
                 </a:extLst>
               </a:tr>
@@ -7088,12 +7068,8 @@
                     <a:lstStyle/>
                     <a:p>
                       <a:r>
-                        <a:rPr lang="en-US" sz="1300" dirty="0" err="1"/>
-                        <a:t>entr</a:t>
-                      </a:r>
-                      <a:r>
                         <a:rPr lang="en-US" sz="1300" dirty="0"/>
-                        <a:t>.</a:t>
+                        <a:t>entr.</a:t>
                       </a:r>
                     </a:p>
                   </a:txBody>
@@ -7153,7 +7129,7 @@
                 </a:tc>
                 <a:extLst>
                   <a:ext uri="{0D108BD9-81ED-4DB2-BD59-A6C34878D82A}">
-                    <a16:rowId xmlns:a16="http://schemas.microsoft.com/office/drawing/2014/main" val="4240309375"/>
+                    <a16:rowId xmlns:a16="http://schemas.microsoft.com/office/drawing/2014/main" xmlns="" val="4240309375"/>
                   </a:ext>
                 </a:extLst>
               </a:tr>
@@ -7174,7 +7150,7 @@
                     <a:lstStyle/>
                     <a:p>
                       <a:r>
-                        <a:rPr lang="en-US" sz="1300" b="1" dirty="0" err="1"/>
+                        <a:rPr lang="en-US" sz="1300" b="1" dirty="0"/>
                         <a:t>gini</a:t>
                       </a:r>
                     </a:p>
@@ -7235,7 +7211,7 @@
                 </a:tc>
                 <a:extLst>
                   <a:ext uri="{0D108BD9-81ED-4DB2-BD59-A6C34878D82A}">
-                    <a16:rowId xmlns:a16="http://schemas.microsoft.com/office/drawing/2014/main" val="4194789348"/>
+                    <a16:rowId xmlns:a16="http://schemas.microsoft.com/office/drawing/2014/main" xmlns="" val="4194789348"/>
                   </a:ext>
                 </a:extLst>
               </a:tr>
@@ -7262,16 +7238,10 @@
                         <a:buNone/>
                       </a:pPr>
                       <a:r>
-                        <a:rPr lang="en-US" sz="1300" b="0" i="0" u="none" strike="noStrike" noProof="0" dirty="0" err="1">
-                          <a:latin typeface="Calibri"/>
-                        </a:rPr>
-                        <a:t>entr</a:t>
-                      </a:r>
-                      <a:r>
                         <a:rPr lang="en-US" sz="1300" b="0" i="0" u="none" strike="noStrike" noProof="0" dirty="0">
                           <a:latin typeface="Calibri"/>
                         </a:rPr>
-                        <a:t>.</a:t>
+                        <a:t>entr.</a:t>
                       </a:r>
                       <a:endParaRPr lang="en-US" dirty="0"/>
                     </a:p>
@@ -7332,7 +7302,7 @@
                 </a:tc>
                 <a:extLst>
                   <a:ext uri="{0D108BD9-81ED-4DB2-BD59-A6C34878D82A}">
-                    <a16:rowId xmlns:a16="http://schemas.microsoft.com/office/drawing/2014/main" val="1934158036"/>
+                    <a16:rowId xmlns:a16="http://schemas.microsoft.com/office/drawing/2014/main" xmlns="" val="1934158036"/>
                   </a:ext>
                 </a:extLst>
               </a:tr>
@@ -7356,12 +7326,12 @@
                         <a:buNone/>
                       </a:pPr>
                       <a:r>
-                        <a:rPr lang="en-US" sz="1300" b="0" i="0" u="none" strike="noStrike" noProof="0" dirty="0" err="1">
+                        <a:rPr lang="en-US" sz="1300" b="0" i="0" u="none" strike="noStrike" noProof="0" dirty="0">
                           <a:latin typeface="Calibri"/>
                         </a:rPr>
                         <a:t>gini</a:t>
                       </a:r>
-                      <a:endParaRPr lang="en-US" dirty="0" err="1"/>
+                      <a:endParaRPr lang="en-US" dirty="0"/>
                     </a:p>
                   </a:txBody>
                   <a:tcPr/>
@@ -7420,7 +7390,7 @@
                 </a:tc>
                 <a:extLst>
                   <a:ext uri="{0D108BD9-81ED-4DB2-BD59-A6C34878D82A}">
-                    <a16:rowId xmlns:a16="http://schemas.microsoft.com/office/drawing/2014/main" val="1742589767"/>
+                    <a16:rowId xmlns:a16="http://schemas.microsoft.com/office/drawing/2014/main" xmlns="" val="1742589767"/>
                   </a:ext>
                 </a:extLst>
               </a:tr>
@@ -7433,7 +7403,7 @@
           <p:cNvPr id="22" name="TextBox 21">
             <a:extLst>
               <a:ext uri="{FF2B5EF4-FFF2-40B4-BE49-F238E27FC236}">
-                <a16:creationId xmlns:a16="http://schemas.microsoft.com/office/drawing/2014/main" id="{22635174-79A3-49B7-AF6D-951AEC4E3EE5}"/>
+                <a16:creationId xmlns:a16="http://schemas.microsoft.com/office/drawing/2014/main" xmlns="" id="{22635174-79A3-49B7-AF6D-951AEC4E3EE5}"/>
               </a:ext>
             </a:extLst>
           </p:cNvPr>
@@ -7463,7 +7433,6 @@
               <a:rPr lang="en-US" dirty="0"/>
               <a:t>+ Easy to interpret</a:t>
             </a:r>
-            <a:endParaRPr lang="en-US"/>
           </a:p>
           <a:p>
             <a:r>
@@ -7485,15 +7454,7 @@
           <a:p>
             <a:r>
               <a:rPr lang="en-US" dirty="0"/>
-              <a:t>use default criterion '</a:t>
-            </a:r>
-            <a:r>
-              <a:rPr lang="en-US" dirty="0" err="1"/>
-              <a:t>gini</a:t>
-            </a:r>
-            <a:r>
-              <a:rPr lang="en-US" dirty="0"/>
-              <a:t>'.</a:t>
+              <a:t>use default criterion 'gini'.</a:t>
             </a:r>
             <a:endParaRPr lang="en-US" dirty="0">
               <a:cs typeface="Calibri"/>
@@ -8163,7 +8124,7 @@
               <a:t>, </a:t>
             </a:r>
             <a:r>
-              <a:rPr lang="en-US" sz="1400" b="1" i="1" dirty="0" err="1">
+              <a:rPr lang="en-US" sz="1400" b="1" i="1" dirty="0">
                 <a:solidFill>
                   <a:schemeClr val="tx1"/>
                 </a:solidFill>
@@ -8192,48 +8153,17 @@
                   <a:schemeClr val="tx1"/>
                 </a:solidFill>
               </a:rPr>
-              <a:t>, </a:t>
-            </a:r>
-            <a:r>
-              <a:rPr lang="en-US" sz="1400" b="1" dirty="0" err="1">
+              <a:t>, max_depth = 15, </a:t>
+            </a:r>
+            <a:r>
+              <a:rPr lang="en-GB" sz="1400" b="1" dirty="0">
                 <a:solidFill>
                   <a:schemeClr val="tx1"/>
                 </a:solidFill>
-              </a:rPr>
-              <a:t>max_depth</a:t>
-            </a:r>
-            <a:r>
-              <a:rPr lang="en-US" sz="1400" b="1" dirty="0">
-                <a:solidFill>
-                  <a:schemeClr val="tx1"/>
-                </a:solidFill>
-              </a:rPr>
-              <a:t> = 15, </a:t>
-            </a:r>
-            <a:r>
-              <a:rPr lang="en-GB" sz="1400" b="1" dirty="0" err="1">
-                <a:solidFill>
-                  <a:schemeClr val="tx1"/>
-                </a:solidFill>
                 <a:cs typeface="Calibri"/>
               </a:rPr>
-              <a:t>n_estimators</a:t>
-            </a:r>
-            <a:r>
-              <a:rPr lang="en-GB" sz="1400" b="1" dirty="0">
-                <a:solidFill>
-                  <a:schemeClr val="tx1"/>
-                </a:solidFill>
-                <a:cs typeface="Calibri"/>
-              </a:rPr>
-              <a:t> = 73; ROC AUC = 0.879, accuracy = 0.937</a:t>
-            </a:r>
-            <a:endParaRPr lang="en-GB" sz="1400" b="1">
-              <a:solidFill>
-                <a:schemeClr val="tx1"/>
-              </a:solidFill>
-              <a:cs typeface="Calibri"/>
-            </a:endParaRPr>
+              <a:t>n_estimators = 73; ROC AUC = 0.879, accuracy = 0.937</a:t>
+            </a:r>
           </a:p>
         </p:txBody>
       </p:sp>
@@ -8448,7 +8378,7 @@
               <a:buChar char="•"/>
             </a:pPr>
             <a:r>
-              <a:rPr lang="en-US" sz="1800" i="1" dirty="0" err="1">
+              <a:rPr lang="en-US" sz="1800" i="1" dirty="0">
                 <a:solidFill>
                   <a:schemeClr val="tx1"/>
                 </a:solidFill>
@@ -8479,14 +8409,14 @@
               <a:t> than </a:t>
             </a:r>
             <a:r>
-              <a:rPr lang="en-US" sz="1800" i="1" dirty="0" err="1">
+              <a:rPr lang="en-US" sz="1800" i="1" dirty="0">
                 <a:solidFill>
                   <a:schemeClr val="tx1"/>
                 </a:solidFill>
               </a:rPr>
               <a:t>max_depth</a:t>
             </a:r>
-            <a:endParaRPr lang="en-US" sz="1800" i="1">
+            <a:endParaRPr lang="en-US" sz="1800" i="1" dirty="0">
               <a:solidFill>
                 <a:schemeClr val="tx1"/>
               </a:solidFill>
@@ -8562,7 +8492,7 @@
           <p:cNvPr id="7" name="Picture 9" descr="Table&#10;&#10;Description automatically generated">
             <a:extLst>
               <a:ext uri="{FF2B5EF4-FFF2-40B4-BE49-F238E27FC236}">
-                <a16:creationId xmlns:a16="http://schemas.microsoft.com/office/drawing/2014/main" id="{885C8537-25DA-4D8A-B87A-16317704D0A0}"/>
+                <a16:creationId xmlns:a16="http://schemas.microsoft.com/office/drawing/2014/main" xmlns="" id="{885C8537-25DA-4D8A-B87A-16317704D0A0}"/>
               </a:ext>
             </a:extLst>
           </p:cNvPr>
@@ -8592,7 +8522,7 @@
           <p:cNvPr id="12" name="Picture 12" descr="Chart&#10;&#10;Description automatically generated">
             <a:extLst>
               <a:ext uri="{FF2B5EF4-FFF2-40B4-BE49-F238E27FC236}">
-                <a16:creationId xmlns:a16="http://schemas.microsoft.com/office/drawing/2014/main" id="{01C71B3F-34DC-427F-9A76-9B75A6A066C1}"/>
+                <a16:creationId xmlns:a16="http://schemas.microsoft.com/office/drawing/2014/main" xmlns="" id="{01C71B3F-34DC-427F-9A76-9B75A6A066C1}"/>
               </a:ext>
             </a:extLst>
           </p:cNvPr>
@@ -8686,7 +8616,7 @@
           </a:lstStyle>
           <a:p>
             <a:r>
-              <a:rPr lang="en-US" dirty="0" err="1"/>
+              <a:rPr lang="en-US" dirty="0"/>
               <a:t>XGBoost</a:t>
             </a:r>
             <a:endParaRPr lang="en-GB" dirty="0"/>
@@ -9046,7 +8976,7 @@
               <a:buChar char="•"/>
             </a:pPr>
             <a:r>
-              <a:rPr lang="en-US" sz="1800" i="1" dirty="0" err="1">
+              <a:rPr lang="en-US" sz="1800" i="1" dirty="0">
                 <a:solidFill>
                   <a:schemeClr val="tx1"/>
                 </a:solidFill>
@@ -9062,18 +8992,13 @@
               <a:t> booster is faster than </a:t>
             </a:r>
             <a:r>
-              <a:rPr lang="en-US" sz="1800" i="1" dirty="0" err="1">
+              <a:rPr lang="en-US" sz="1800" i="1" dirty="0">
                 <a:solidFill>
                   <a:schemeClr val="tx1"/>
                 </a:solidFill>
               </a:rPr>
               <a:t>gbtree</a:t>
             </a:r>
-            <a:endParaRPr lang="en-US" sz="1800" i="1" dirty="0">
-              <a:solidFill>
-                <a:schemeClr val="tx1"/>
-              </a:solidFill>
-            </a:endParaRPr>
           </a:p>
           <a:p>
             <a:pPr marL="457200" indent="-457200" algn="l">
@@ -9081,7 +9006,7 @@
               <a:buChar char="•"/>
             </a:pPr>
             <a:r>
-              <a:rPr lang="en-US" sz="1800" i="1" dirty="0" err="1">
+              <a:rPr lang="en-US" sz="1800" i="1" dirty="0">
                 <a:solidFill>
                   <a:schemeClr val="tx1"/>
                 </a:solidFill>
@@ -9112,18 +9037,13 @@
               <a:t> than </a:t>
             </a:r>
             <a:r>
-              <a:rPr lang="en-US" sz="1800" i="1" dirty="0" err="1">
+              <a:rPr lang="en-US" sz="1800" i="1" dirty="0">
                 <a:solidFill>
                   <a:schemeClr val="tx1"/>
                 </a:solidFill>
               </a:rPr>
               <a:t>learning_rate</a:t>
             </a:r>
-            <a:endParaRPr lang="en-US" sz="1800" i="1" dirty="0">
-              <a:solidFill>
-                <a:schemeClr val="tx1"/>
-              </a:solidFill>
-            </a:endParaRPr>
           </a:p>
           <a:p>
             <a:pPr marL="457200" indent="-457200" algn="l">
@@ -9139,7 +9059,7 @@
               <a:t>Carefully select </a:t>
             </a:r>
             <a:r>
-              <a:rPr lang="en-US" sz="1800" i="1" dirty="0" err="1">
+              <a:rPr lang="en-US" sz="1800" i="1" dirty="0">
                 <a:solidFill>
                   <a:schemeClr val="tx1"/>
                 </a:solidFill>
@@ -9548,7 +9468,7 @@
               <a:buChar char="•"/>
             </a:pPr>
             <a:r>
-              <a:rPr lang="en-US" sz="1800" i="1" dirty="0" err="1">
+              <a:rPr lang="en-US" sz="1800" i="1" dirty="0">
                 <a:solidFill>
                   <a:schemeClr val="tx1"/>
                 </a:solidFill>
@@ -9586,18 +9506,13 @@
               <a:t> booster is very close to </a:t>
             </a:r>
             <a:r>
-              <a:rPr lang="en-US" sz="1800" i="1" dirty="0" err="1">
+              <a:rPr lang="en-US" sz="1800" i="1" dirty="0">
                 <a:solidFill>
                   <a:schemeClr val="tx1"/>
                 </a:solidFill>
               </a:rPr>
               <a:t>gbtree</a:t>
             </a:r>
-            <a:endParaRPr lang="en-US" sz="1800" i="1" dirty="0">
-              <a:solidFill>
-                <a:schemeClr val="tx1"/>
-              </a:solidFill>
-            </a:endParaRPr>
           </a:p>
           <a:p>
             <a:pPr marL="457200" indent="-457200" algn="l">
@@ -9620,6 +9535,14 @@
               </a:rPr>
               <a:t>ROC AUC = .968587</a:t>
             </a:r>
+            <a:r>
+              <a:rPr lang="en-US" sz="1800" dirty="0">
+                <a:solidFill>
+                  <a:schemeClr val="tx1"/>
+                </a:solidFill>
+              </a:rPr>
+              <a:t/>
+            </a:r>
             <a:br>
               <a:rPr lang="en-US" sz="1800" dirty="0">
                 <a:solidFill>
@@ -9633,39 +9556,7 @@
                   <a:schemeClr val="tx1"/>
                 </a:solidFill>
               </a:rPr>
-              <a:t>@ booster = </a:t>
-            </a:r>
-            <a:r>
-              <a:rPr lang="en-US" sz="1800" dirty="0" err="1">
-                <a:solidFill>
-                  <a:schemeClr val="tx1"/>
-                </a:solidFill>
-              </a:rPr>
-              <a:t>gbtree</a:t>
-            </a:r>
-            <a:r>
-              <a:rPr lang="en-US" sz="1800" dirty="0">
-                <a:solidFill>
-                  <a:schemeClr val="tx1"/>
-                </a:solidFill>
-              </a:rPr>
-              <a:t>, </a:t>
-            </a:r>
-            <a:r>
-              <a:rPr lang="en-US" sz="1800" dirty="0" err="1">
-                <a:solidFill>
-                  <a:schemeClr val="tx1"/>
-                </a:solidFill>
-              </a:rPr>
-              <a:t>learning_rate</a:t>
-            </a:r>
-            <a:r>
-              <a:rPr lang="en-US" sz="1800" dirty="0">
-                <a:solidFill>
-                  <a:schemeClr val="tx1"/>
-                </a:solidFill>
-              </a:rPr>
-              <a:t> = 0.01,</a:t>
+              <a:t>@ booster = gbtree, learning_rate = 0.01,</a:t>
             </a:r>
             <a:br>
               <a:rPr lang="en-US" sz="1800" dirty="0">
@@ -9675,20 +9566,12 @@
               </a:rPr>
             </a:br>
             <a:r>
-              <a:rPr lang="en-US" sz="1800" dirty="0" err="1">
+              <a:rPr lang="en-US" sz="1800" dirty="0">
                 <a:solidFill>
                   <a:schemeClr val="tx1"/>
                 </a:solidFill>
               </a:rPr>
-              <a:t>n_estimators</a:t>
-            </a:r>
-            <a:r>
-              <a:rPr lang="en-US" sz="1800" dirty="0">
-                <a:solidFill>
-                  <a:schemeClr val="tx1"/>
-                </a:solidFill>
-              </a:rPr>
-              <a:t> = 70</a:t>
+              <a:t>n_estimators = 70</a:t>
             </a:r>
             <a:endParaRPr lang="en-GB" sz="1800" dirty="0">
               <a:solidFill>
@@ -10204,7 +10087,7 @@
           <p:cNvPr id="7" name="TextBox 6">
             <a:extLst>
               <a:ext uri="{FF2B5EF4-FFF2-40B4-BE49-F238E27FC236}">
-                <a16:creationId xmlns:a16="http://schemas.microsoft.com/office/drawing/2014/main" id="{864E28D5-B97F-43AE-9E97-B541A8248E08}"/>
+                <a16:creationId xmlns:a16="http://schemas.microsoft.com/office/drawing/2014/main" xmlns="" id="{864E28D5-B97F-43AE-9E97-B541A8248E08}"/>
               </a:ext>
             </a:extLst>
           </p:cNvPr>
@@ -10242,17 +10125,9 @@
                   <a:srgbClr val="7030A0"/>
                 </a:solidFill>
               </a:rPr>
-              <a:t>Default: </a:t>
-            </a:r>
-            <a:r>
-              <a:rPr lang="en-US" b="1" dirty="0" err="1">
-                <a:solidFill>
-                  <a:srgbClr val="7030A0"/>
-                </a:solidFill>
-              </a:rPr>
-              <a:t>gbtree</a:t>
-            </a:r>
-            <a:endParaRPr lang="en-US" b="1" dirty="0" err="1">
+              <a:t>Default: gbtree</a:t>
+            </a:r>
+            <a:endParaRPr lang="en-US" b="1" dirty="0">
               <a:solidFill>
                 <a:srgbClr val="7030A0"/>
               </a:solidFill>
@@ -10301,7 +10176,7 @@
           <p:cNvPr id="8" name="Straight Arrow Connector 7">
             <a:extLst>
               <a:ext uri="{FF2B5EF4-FFF2-40B4-BE49-F238E27FC236}">
-                <a16:creationId xmlns:a16="http://schemas.microsoft.com/office/drawing/2014/main" id="{6B79884A-2B92-4DE3-9CD7-C77BCDB6478B}"/>
+                <a16:creationId xmlns:a16="http://schemas.microsoft.com/office/drawing/2014/main" xmlns="" id="{6B79884A-2B92-4DE3-9CD7-C77BCDB6478B}"/>
               </a:ext>
             </a:extLst>
           </p:cNvPr>
@@ -10343,7 +10218,7 @@
           <p:cNvPr id="9" name="TextBox 8">
             <a:extLst>
               <a:ext uri="{FF2B5EF4-FFF2-40B4-BE49-F238E27FC236}">
-                <a16:creationId xmlns:a16="http://schemas.microsoft.com/office/drawing/2014/main" id="{9567BA7A-2D3D-4EC9-B108-369D0D32FF68}"/>
+                <a16:creationId xmlns:a16="http://schemas.microsoft.com/office/drawing/2014/main" xmlns="" id="{9567BA7A-2D3D-4EC9-B108-369D0D32FF68}"/>
               </a:ext>
             </a:extLst>
           </p:cNvPr>
@@ -10371,7 +10246,7 @@
           <a:p>
             <a:pPr algn="l"/>
             <a:r>
-              <a:rPr lang="en-US" dirty="0" err="1"/>
+              <a:rPr lang="en-US" dirty="0"/>
               <a:t>learning_rate</a:t>
             </a:r>
           </a:p>
@@ -10382,7 +10257,7 @@
           <p:cNvPr id="10" name="TextBox 9">
             <a:extLst>
               <a:ext uri="{FF2B5EF4-FFF2-40B4-BE49-F238E27FC236}">
-                <a16:creationId xmlns:a16="http://schemas.microsoft.com/office/drawing/2014/main" id="{F45AB9C5-F2F8-4D1C-976D-10C246F7BF21}"/>
+                <a16:creationId xmlns:a16="http://schemas.microsoft.com/office/drawing/2014/main" xmlns="" id="{F45AB9C5-F2F8-4D1C-976D-10C246F7BF21}"/>
               </a:ext>
             </a:extLst>
           </p:cNvPr>
@@ -10471,7 +10346,7 @@
           <p:cNvPr id="11" name="TextBox 10">
             <a:extLst>
               <a:ext uri="{FF2B5EF4-FFF2-40B4-BE49-F238E27FC236}">
-                <a16:creationId xmlns:a16="http://schemas.microsoft.com/office/drawing/2014/main" id="{028CF507-DB34-4D02-934A-DA51FBB4BABF}"/>
+                <a16:creationId xmlns:a16="http://schemas.microsoft.com/office/drawing/2014/main" xmlns="" id="{028CF507-DB34-4D02-934A-DA51FBB4BABF}"/>
               </a:ext>
             </a:extLst>
           </p:cNvPr>
@@ -10498,10 +10373,10 @@
           <a:lstStyle/>
           <a:p>
             <a:r>
-              <a:rPr lang="en-US" dirty="0" err="1"/>
+              <a:rPr lang="en-US" dirty="0"/>
               <a:t>n_estimators</a:t>
             </a:r>
-            <a:endParaRPr lang="en-US" dirty="0" err="1">
+            <a:endParaRPr lang="en-US" dirty="0">
               <a:cs typeface="Calibri"/>
             </a:endParaRPr>
           </a:p>
@@ -10512,7 +10387,7 @@
           <p:cNvPr id="12" name="TextBox 11">
             <a:extLst>
               <a:ext uri="{FF2B5EF4-FFF2-40B4-BE49-F238E27FC236}">
-                <a16:creationId xmlns:a16="http://schemas.microsoft.com/office/drawing/2014/main" id="{2C2812E4-9595-424C-A40A-CCD7A4E2F21A}"/>
+                <a16:creationId xmlns:a16="http://schemas.microsoft.com/office/drawing/2014/main" xmlns="" id="{2C2812E4-9595-424C-A40A-CCD7A4E2F21A}"/>
               </a:ext>
             </a:extLst>
           </p:cNvPr>
@@ -10575,16 +10450,10 @@
           <a:p>
             <a:pPr algn="ctr"/>
             <a:r>
-              <a:rPr lang="en-US" dirty="0" err="1">
-                <a:cs typeface="Calibri"/>
-              </a:rPr>
-              <a:t>Accur</a:t>
-            </a:r>
-            <a:r>
               <a:rPr lang="en-US" dirty="0">
                 <a:cs typeface="Calibri"/>
               </a:rPr>
-              <a:t>. = </a:t>
+              <a:t>Accur. = </a:t>
             </a:r>
             <a:r>
               <a:rPr lang="en-US" dirty="0">
@@ -10604,7 +10473,7 @@
           <p:cNvPr id="14" name="Straight Arrow Connector 13">
             <a:extLst>
               <a:ext uri="{FF2B5EF4-FFF2-40B4-BE49-F238E27FC236}">
-                <a16:creationId xmlns:a16="http://schemas.microsoft.com/office/drawing/2014/main" id="{EF850ACB-8237-4CED-8717-9673966EEC4A}"/>
+                <a16:creationId xmlns:a16="http://schemas.microsoft.com/office/drawing/2014/main" xmlns="" id="{EF850ACB-8237-4CED-8717-9673966EEC4A}"/>
               </a:ext>
             </a:extLst>
           </p:cNvPr>
@@ -10646,7 +10515,7 @@
           <p:cNvPr id="20" name="Straight Arrow Connector 19">
             <a:extLst>
               <a:ext uri="{FF2B5EF4-FFF2-40B4-BE49-F238E27FC236}">
-                <a16:creationId xmlns:a16="http://schemas.microsoft.com/office/drawing/2014/main" id="{5313BC97-1A17-4949-A9A8-C5871381B623}"/>
+                <a16:creationId xmlns:a16="http://schemas.microsoft.com/office/drawing/2014/main" xmlns="" id="{5313BC97-1A17-4949-A9A8-C5871381B623}"/>
               </a:ext>
             </a:extLst>
           </p:cNvPr>
@@ -10688,7 +10557,7 @@
           <p:cNvPr id="25" name="TextBox 24">
             <a:extLst>
               <a:ext uri="{FF2B5EF4-FFF2-40B4-BE49-F238E27FC236}">
-                <a16:creationId xmlns:a16="http://schemas.microsoft.com/office/drawing/2014/main" id="{85E603B7-6897-4764-9D80-86359618F9AE}"/>
+                <a16:creationId xmlns:a16="http://schemas.microsoft.com/office/drawing/2014/main" xmlns="" id="{85E603B7-6897-4764-9D80-86359618F9AE}"/>
               </a:ext>
             </a:extLst>
           </p:cNvPr>
@@ -10716,7 +10585,7 @@
           <a:p>
             <a:pPr algn="l"/>
             <a:r>
-              <a:rPr lang="en-US" dirty="0" err="1"/>
+              <a:rPr lang="en-US" dirty="0"/>
               <a:t>reg_alpha</a:t>
             </a:r>
           </a:p>
@@ -10727,7 +10596,7 @@
           <p:cNvPr id="26" name="TextBox 25">
             <a:extLst>
               <a:ext uri="{FF2B5EF4-FFF2-40B4-BE49-F238E27FC236}">
-                <a16:creationId xmlns:a16="http://schemas.microsoft.com/office/drawing/2014/main" id="{B15223F2-523E-4E61-8442-5FAC07094BE6}"/>
+                <a16:creationId xmlns:a16="http://schemas.microsoft.com/office/drawing/2014/main" xmlns="" id="{B15223F2-523E-4E61-8442-5FAC07094BE6}"/>
               </a:ext>
             </a:extLst>
           </p:cNvPr>
@@ -10793,16 +10662,10 @@
           <a:p>
             <a:pPr algn="ctr"/>
             <a:r>
-              <a:rPr lang="en-US" dirty="0" err="1">
-                <a:cs typeface="Calibri"/>
-              </a:rPr>
-              <a:t>Accur</a:t>
-            </a:r>
-            <a:r>
               <a:rPr lang="en-US" dirty="0">
                 <a:cs typeface="Calibri"/>
               </a:rPr>
-              <a:t>. = </a:t>
+              <a:t>Accur. = </a:t>
             </a:r>
             <a:r>
               <a:rPr lang="en-US" dirty="0">
@@ -10822,7 +10685,7 @@
           <p:cNvPr id="29" name="Arrow: Curved Up 28">
             <a:extLst>
               <a:ext uri="{FF2B5EF4-FFF2-40B4-BE49-F238E27FC236}">
-                <a16:creationId xmlns:a16="http://schemas.microsoft.com/office/drawing/2014/main" id="{C1D80E36-3A5E-4C6D-A6FD-AE7AA49A0C65}"/>
+                <a16:creationId xmlns:a16="http://schemas.microsoft.com/office/drawing/2014/main" xmlns="" id="{C1D80E36-3A5E-4C6D-A6FD-AE7AA49A0C65}"/>
               </a:ext>
             </a:extLst>
           </p:cNvPr>
@@ -10864,7 +10727,7 @@
           <a:lstStyle/>
           <a:p>
             <a:pPr algn="ctr"/>
-            <a:endParaRPr lang="en-US">
+            <a:endParaRPr lang="en-US" dirty="0">
               <a:solidFill>
                 <a:schemeClr val="tx1"/>
               </a:solidFill>
@@ -10877,7 +10740,7 @@
           <p:cNvPr id="30" name="TextBox 29">
             <a:extLst>
               <a:ext uri="{FF2B5EF4-FFF2-40B4-BE49-F238E27FC236}">
-                <a16:creationId xmlns:a16="http://schemas.microsoft.com/office/drawing/2014/main" id="{E7759DFE-14F6-4DF1-BA73-0F607A6C633E}"/>
+                <a16:creationId xmlns:a16="http://schemas.microsoft.com/office/drawing/2014/main" xmlns="" id="{E7759DFE-14F6-4DF1-BA73-0F607A6C633E}"/>
               </a:ext>
             </a:extLst>
           </p:cNvPr>
@@ -10916,7 +10779,7 @@
           <p:cNvPr id="31" name="Arrow: Curved Right 30">
             <a:extLst>
               <a:ext uri="{FF2B5EF4-FFF2-40B4-BE49-F238E27FC236}">
-                <a16:creationId xmlns:a16="http://schemas.microsoft.com/office/drawing/2014/main" id="{EC24B5A2-2534-44D2-9A11-FD7DE7AA8AC6}"/>
+                <a16:creationId xmlns:a16="http://schemas.microsoft.com/office/drawing/2014/main" xmlns="" id="{EC24B5A2-2534-44D2-9A11-FD7DE7AA8AC6}"/>
               </a:ext>
             </a:extLst>
           </p:cNvPr>
@@ -10958,7 +10821,7 @@
           <a:lstStyle/>
           <a:p>
             <a:pPr algn="ctr"/>
-            <a:endParaRPr lang="en-US">
+            <a:endParaRPr lang="en-US" dirty="0">
               <a:solidFill>
                 <a:schemeClr val="tx1"/>
               </a:solidFill>
@@ -10971,7 +10834,7 @@
           <p:cNvPr id="32" name="TextBox 31">
             <a:extLst>
               <a:ext uri="{FF2B5EF4-FFF2-40B4-BE49-F238E27FC236}">
-                <a16:creationId xmlns:a16="http://schemas.microsoft.com/office/drawing/2014/main" id="{BFD7BC3B-9012-44F8-92BF-34632123B139}"/>
+                <a16:creationId xmlns:a16="http://schemas.microsoft.com/office/drawing/2014/main" xmlns="" id="{BFD7BC3B-9012-44F8-92BF-34632123B139}"/>
               </a:ext>
             </a:extLst>
           </p:cNvPr>
@@ -10999,7 +10862,7 @@
           <a:p>
             <a:pPr algn="l"/>
             <a:r>
-              <a:rPr lang="en-US" dirty="0" err="1"/>
+              <a:rPr lang="en-US" dirty="0"/>
               <a:t>max_depth</a:t>
             </a:r>
           </a:p>
@@ -11010,7 +10873,7 @@
           <p:cNvPr id="33" name="Straight Arrow Connector 32">
             <a:extLst>
               <a:ext uri="{FF2B5EF4-FFF2-40B4-BE49-F238E27FC236}">
-                <a16:creationId xmlns:a16="http://schemas.microsoft.com/office/drawing/2014/main" id="{E1DD569B-64D5-403B-B3D7-B1904EC0B686}"/>
+                <a16:creationId xmlns:a16="http://schemas.microsoft.com/office/drawing/2014/main" xmlns="" id="{E1DD569B-64D5-403B-B3D7-B1904EC0B686}"/>
               </a:ext>
             </a:extLst>
           </p:cNvPr>
@@ -11052,7 +10915,7 @@
           <p:cNvPr id="34" name="TextBox 33">
             <a:extLst>
               <a:ext uri="{FF2B5EF4-FFF2-40B4-BE49-F238E27FC236}">
-                <a16:creationId xmlns:a16="http://schemas.microsoft.com/office/drawing/2014/main" id="{DE5CD607-3B95-41B5-90DB-F7046BF9884D}"/>
+                <a16:creationId xmlns:a16="http://schemas.microsoft.com/office/drawing/2014/main" xmlns="" id="{DE5CD607-3B95-41B5-90DB-F7046BF9884D}"/>
               </a:ext>
             </a:extLst>
           </p:cNvPr>
@@ -11119,16 +10982,10 @@
           <a:p>
             <a:pPr algn="ctr"/>
             <a:r>
-              <a:rPr lang="en-US" dirty="0" err="1">
-                <a:cs typeface="Calibri"/>
-              </a:rPr>
-              <a:t>Accur</a:t>
-            </a:r>
-            <a:r>
               <a:rPr lang="en-US" dirty="0">
                 <a:cs typeface="Calibri"/>
               </a:rPr>
-              <a:t>. = </a:t>
+              <a:t>Accur. = </a:t>
             </a:r>
             <a:r>
               <a:rPr lang="en-US" dirty="0">
@@ -11149,7 +11006,7 @@
           <p:cNvPr id="35" name="TextBox 34">
             <a:extLst>
               <a:ext uri="{FF2B5EF4-FFF2-40B4-BE49-F238E27FC236}">
-                <a16:creationId xmlns:a16="http://schemas.microsoft.com/office/drawing/2014/main" id="{0FE58C54-8200-4F1E-9643-EF2B2709354B}"/>
+                <a16:creationId xmlns:a16="http://schemas.microsoft.com/office/drawing/2014/main" xmlns="" id="{0FE58C54-8200-4F1E-9643-EF2B2709354B}"/>
               </a:ext>
             </a:extLst>
           </p:cNvPr>
@@ -11176,7 +11033,7 @@
           <a:lstStyle/>
           <a:p>
             <a:r>
-              <a:rPr lang="en-US" dirty="0" err="1">
+              <a:rPr lang="en-US" dirty="0">
                 <a:cs typeface="Calibri"/>
               </a:rPr>
               <a:t>n_estimators</a:t>
@@ -11189,7 +11046,7 @@
           <p:cNvPr id="36" name="Arrow: Curved Up 35">
             <a:extLst>
               <a:ext uri="{FF2B5EF4-FFF2-40B4-BE49-F238E27FC236}">
-                <a16:creationId xmlns:a16="http://schemas.microsoft.com/office/drawing/2014/main" id="{5AE3B87B-B74A-4CC1-8752-18EE78CB842F}"/>
+                <a16:creationId xmlns:a16="http://schemas.microsoft.com/office/drawing/2014/main" xmlns="" id="{5AE3B87B-B74A-4CC1-8752-18EE78CB842F}"/>
               </a:ext>
             </a:extLst>
           </p:cNvPr>
@@ -11231,7 +11088,7 @@
           <a:lstStyle/>
           <a:p>
             <a:pPr algn="ctr"/>
-            <a:endParaRPr lang="en-US">
+            <a:endParaRPr lang="en-US" dirty="0">
               <a:solidFill>
                 <a:schemeClr val="tx1"/>
               </a:solidFill>
@@ -11244,7 +11101,7 @@
           <p:cNvPr id="37" name="TextBox 36">
             <a:extLst>
               <a:ext uri="{FF2B5EF4-FFF2-40B4-BE49-F238E27FC236}">
-                <a16:creationId xmlns:a16="http://schemas.microsoft.com/office/drawing/2014/main" id="{D4EC8975-FCEF-4C66-B18E-0A43583F89A5}"/>
+                <a16:creationId xmlns:a16="http://schemas.microsoft.com/office/drawing/2014/main" xmlns="" id="{D4EC8975-FCEF-4C66-B18E-0A43583F89A5}"/>
               </a:ext>
             </a:extLst>
           </p:cNvPr>
@@ -11271,23 +11128,16 @@
           <a:lstStyle/>
           <a:p>
             <a:r>
-              <a:rPr lang="en-US" dirty="0" err="1">
-                <a:ea typeface="+mn-lt"/>
-                <a:cs typeface="+mn-lt"/>
-              </a:rPr>
-              <a:t>reg_lambda</a:t>
-            </a:r>
-            <a:r>
               <a:rPr lang="en-US" dirty="0">
                 <a:ea typeface="+mn-lt"/>
                 <a:cs typeface="+mn-lt"/>
               </a:rPr>
-              <a:t>,</a:t>
-            </a:r>
-          </a:p>
-          <a:p>
-            <a:r>
-              <a:rPr lang="en-US" dirty="0" err="1">
+              <a:t>reg_lambda,</a:t>
+            </a:r>
+          </a:p>
+          <a:p>
+            <a:r>
+              <a:rPr lang="en-US" dirty="0">
                 <a:ea typeface="+mn-lt"/>
                 <a:cs typeface="+mn-lt"/>
               </a:rPr>
@@ -11301,7 +11151,7 @@
           <p:cNvPr id="38" name="Arrow: Curved Up 37">
             <a:extLst>
               <a:ext uri="{FF2B5EF4-FFF2-40B4-BE49-F238E27FC236}">
-                <a16:creationId xmlns:a16="http://schemas.microsoft.com/office/drawing/2014/main" id="{3EE07727-00D4-4D44-8A2F-E5F51366B80C}"/>
+                <a16:creationId xmlns:a16="http://schemas.microsoft.com/office/drawing/2014/main" xmlns="" id="{3EE07727-00D4-4D44-8A2F-E5F51366B80C}"/>
               </a:ext>
             </a:extLst>
           </p:cNvPr>
@@ -11343,7 +11193,7 @@
           <a:lstStyle/>
           <a:p>
             <a:pPr algn="ctr"/>
-            <a:endParaRPr lang="en-US">
+            <a:endParaRPr lang="en-US" dirty="0">
               <a:solidFill>
                 <a:schemeClr val="tx1"/>
               </a:solidFill>
@@ -11356,7 +11206,7 @@
           <p:cNvPr id="40" name="TextBox 39">
             <a:extLst>
               <a:ext uri="{FF2B5EF4-FFF2-40B4-BE49-F238E27FC236}">
-                <a16:creationId xmlns:a16="http://schemas.microsoft.com/office/drawing/2014/main" id="{810CD7F2-645F-4AB7-85E4-402C3F925AB1}"/>
+                <a16:creationId xmlns:a16="http://schemas.microsoft.com/office/drawing/2014/main" xmlns="" id="{810CD7F2-645F-4AB7-85E4-402C3F925AB1}"/>
               </a:ext>
             </a:extLst>
           </p:cNvPr>
@@ -11393,7 +11243,7 @@
               </a:rPr>
               <a:t> one</a:t>
             </a:r>
-            <a:endParaRPr lang="en-US"/>
+            <a:endParaRPr lang="en-US" dirty="0"/>
           </a:p>
           <a:p>
             <a:r>
@@ -11410,7 +11260,7 @@
           <p:cNvPr id="2" name="TextBox 1">
             <a:extLst>
               <a:ext uri="{FF2B5EF4-FFF2-40B4-BE49-F238E27FC236}">
-                <a16:creationId xmlns:a16="http://schemas.microsoft.com/office/drawing/2014/main" id="{AAFD709B-2FF1-49A6-A4F4-A8D9FA08AC82}"/>
+                <a16:creationId xmlns:a16="http://schemas.microsoft.com/office/drawing/2014/main" xmlns="" id="{AAFD709B-2FF1-49A6-A4F4-A8D9FA08AC82}"/>
               </a:ext>
             </a:extLst>
           </p:cNvPr>
@@ -11438,35 +11288,21 @@
           <a:p>
             <a:pPr algn="ctr"/>
             <a:r>
-              <a:rPr lang="en-US" dirty="0" err="1">
-                <a:latin typeface="Calibri"/>
-                <a:cs typeface="Calibri"/>
-              </a:rPr>
-              <a:t>reg_alpha</a:t>
-            </a:r>
-            <a:r>
               <a:rPr lang="en-US" dirty="0">
                 <a:latin typeface="Calibri"/>
                 <a:cs typeface="Calibri"/>
               </a:rPr>
-              <a:t>,</a:t>
-            </a:r>
-            <a:endParaRPr lang="en-US" dirty="0" err="1">
-              <a:latin typeface="Calibri"/>
-              <a:cs typeface="Calibri"/>
-            </a:endParaRPr>
+              <a:t>reg_alpha,</a:t>
+            </a:r>
           </a:p>
           <a:p>
             <a:pPr algn="ctr"/>
             <a:r>
-              <a:rPr lang="en-US" dirty="0" err="1">
+              <a:rPr lang="en-US" dirty="0">
                 <a:cs typeface="Calibri"/>
               </a:rPr>
               <a:t>reg_lambda</a:t>
             </a:r>
-            <a:endParaRPr lang="en-US">
-              <a:cs typeface="Calibri"/>
-            </a:endParaRPr>
           </a:p>
         </p:txBody>
       </p:sp>
@@ -11475,7 +11311,7 @@
           <p:cNvPr id="13" name="Straight Arrow Connector 12">
             <a:extLst>
               <a:ext uri="{FF2B5EF4-FFF2-40B4-BE49-F238E27FC236}">
-                <a16:creationId xmlns:a16="http://schemas.microsoft.com/office/drawing/2014/main" id="{BDE22AAC-721B-48CB-9984-7A23F26C1F3D}"/>
+                <a16:creationId xmlns:a16="http://schemas.microsoft.com/office/drawing/2014/main" xmlns="" id="{BDE22AAC-721B-48CB-9984-7A23F26C1F3D}"/>
               </a:ext>
             </a:extLst>
           </p:cNvPr>
@@ -11517,7 +11353,7 @@
           <p:cNvPr id="28" name="TextBox 27">
             <a:extLst>
               <a:ext uri="{FF2B5EF4-FFF2-40B4-BE49-F238E27FC236}">
-                <a16:creationId xmlns:a16="http://schemas.microsoft.com/office/drawing/2014/main" id="{EB79231A-183D-4AD1-B526-F5F0F2D4534C}"/>
+                <a16:creationId xmlns:a16="http://schemas.microsoft.com/office/drawing/2014/main" xmlns="" id="{EB79231A-183D-4AD1-B526-F5F0F2D4534C}"/>
               </a:ext>
             </a:extLst>
           </p:cNvPr>
@@ -11584,16 +11420,10 @@
           <a:p>
             <a:pPr algn="ctr"/>
             <a:r>
-              <a:rPr lang="en-US" dirty="0" err="1">
-                <a:cs typeface="Calibri"/>
-              </a:rPr>
-              <a:t>Accur</a:t>
-            </a:r>
-            <a:r>
               <a:rPr lang="en-US" dirty="0">
                 <a:cs typeface="Calibri"/>
               </a:rPr>
-              <a:t>. = </a:t>
+              <a:t>Accur. = </a:t>
             </a:r>
             <a:r>
               <a:rPr lang="en-US" dirty="0">
@@ -11614,7 +11444,7 @@
           <p:cNvPr id="3" name="Straight Arrow Connector 2">
             <a:extLst>
               <a:ext uri="{FF2B5EF4-FFF2-40B4-BE49-F238E27FC236}">
-                <a16:creationId xmlns:a16="http://schemas.microsoft.com/office/drawing/2014/main" id="{1F685C6D-584F-49D8-AFD1-862612D1D971}"/>
+                <a16:creationId xmlns:a16="http://schemas.microsoft.com/office/drawing/2014/main" xmlns="" id="{1F685C6D-584F-49D8-AFD1-862612D1D971}"/>
               </a:ext>
             </a:extLst>
           </p:cNvPr>
@@ -11656,7 +11486,7 @@
           <p:cNvPr id="39" name="TextBox 38">
             <a:extLst>
               <a:ext uri="{FF2B5EF4-FFF2-40B4-BE49-F238E27FC236}">
-                <a16:creationId xmlns:a16="http://schemas.microsoft.com/office/drawing/2014/main" id="{2EE2A871-6C20-4DFF-A731-F71235D44218}"/>
+                <a16:creationId xmlns:a16="http://schemas.microsoft.com/office/drawing/2014/main" xmlns="" id="{2EE2A871-6C20-4DFF-A731-F71235D44218}"/>
               </a:ext>
             </a:extLst>
           </p:cNvPr>
@@ -11683,7 +11513,7 @@
           <a:lstStyle/>
           <a:p>
             <a:r>
-              <a:rPr lang="en-US" dirty="0" err="1">
+              <a:rPr lang="en-US" dirty="0">
                 <a:cs typeface="Calibri"/>
               </a:rPr>
               <a:t>n_estimators</a:t>
@@ -11696,7 +11526,7 @@
           <p:cNvPr id="41" name="TextBox 40">
             <a:extLst>
               <a:ext uri="{FF2B5EF4-FFF2-40B4-BE49-F238E27FC236}">
-                <a16:creationId xmlns:a16="http://schemas.microsoft.com/office/drawing/2014/main" id="{E9046EA1-5983-4E46-875D-825F7F16CD74}"/>
+                <a16:creationId xmlns:a16="http://schemas.microsoft.com/office/drawing/2014/main" xmlns="" id="{E9046EA1-5983-4E46-875D-825F7F16CD74}"/>
               </a:ext>
             </a:extLst>
           </p:cNvPr>
@@ -11763,16 +11593,10 @@
           <a:p>
             <a:pPr algn="ctr"/>
             <a:r>
-              <a:rPr lang="en-US" dirty="0" err="1">
-                <a:cs typeface="Calibri"/>
-              </a:rPr>
-              <a:t>Accur</a:t>
-            </a:r>
-            <a:r>
               <a:rPr lang="en-US" dirty="0">
                 <a:cs typeface="Calibri"/>
               </a:rPr>
-              <a:t>. = </a:t>
+              <a:t>Accur. = </a:t>
             </a:r>
             <a:r>
               <a:rPr lang="en-US" dirty="0">
@@ -11793,7 +11617,7 @@
           <p:cNvPr id="15" name="Straight Arrow Connector 14">
             <a:extLst>
               <a:ext uri="{FF2B5EF4-FFF2-40B4-BE49-F238E27FC236}">
-                <a16:creationId xmlns:a16="http://schemas.microsoft.com/office/drawing/2014/main" id="{72DD7E7C-15E4-4C60-B554-DC7E151A0331}"/>
+                <a16:creationId xmlns:a16="http://schemas.microsoft.com/office/drawing/2014/main" xmlns="" id="{72DD7E7C-15E4-4C60-B554-DC7E151A0331}"/>
               </a:ext>
             </a:extLst>
           </p:cNvPr>
@@ -11835,7 +11659,7 @@
           <p:cNvPr id="16" name="TextBox 15">
             <a:extLst>
               <a:ext uri="{FF2B5EF4-FFF2-40B4-BE49-F238E27FC236}">
-                <a16:creationId xmlns:a16="http://schemas.microsoft.com/office/drawing/2014/main" id="{CF005C68-46C7-4F15-B6B9-B09C5930DED5}"/>
+                <a16:creationId xmlns:a16="http://schemas.microsoft.com/office/drawing/2014/main" xmlns="" id="{CF005C68-46C7-4F15-B6B9-B09C5930DED5}"/>
               </a:ext>
             </a:extLst>
           </p:cNvPr>
@@ -11863,13 +11687,13 @@
           <a:p>
             <a:pPr algn="l"/>
             <a:r>
-              <a:rPr lang="en-US" dirty="0" err="1">
+              <a:rPr lang="en-US" dirty="0">
                 <a:ea typeface="+mn-lt"/>
                 <a:cs typeface="+mn-lt"/>
               </a:rPr>
               <a:t>reg_alpha</a:t>
             </a:r>
-            <a:endParaRPr lang="en-US" dirty="0" err="1"/>
+            <a:endParaRPr lang="en-US" dirty="0"/>
           </a:p>
         </p:txBody>
       </p:sp>
@@ -11878,7 +11702,7 @@
           <p:cNvPr id="42" name="TextBox 41">
             <a:extLst>
               <a:ext uri="{FF2B5EF4-FFF2-40B4-BE49-F238E27FC236}">
-                <a16:creationId xmlns:a16="http://schemas.microsoft.com/office/drawing/2014/main" id="{2A6A3AE2-8CB6-4322-9B15-2A8CB08FAC0F}"/>
+                <a16:creationId xmlns:a16="http://schemas.microsoft.com/office/drawing/2014/main" xmlns="" id="{2A6A3AE2-8CB6-4322-9B15-2A8CB08FAC0F}"/>
               </a:ext>
             </a:extLst>
           </p:cNvPr>
@@ -11954,16 +11778,10 @@
           <a:p>
             <a:pPr algn="ctr"/>
             <a:r>
-              <a:rPr lang="en-US" dirty="0" err="1">
-                <a:cs typeface="Calibri"/>
-              </a:rPr>
-              <a:t>Accur</a:t>
-            </a:r>
-            <a:r>
               <a:rPr lang="en-US" dirty="0">
                 <a:cs typeface="Calibri"/>
               </a:rPr>
-              <a:t>. = </a:t>
+              <a:t>Accur. = </a:t>
             </a:r>
             <a:r>
               <a:rPr lang="en-US" dirty="0">
@@ -11984,7 +11802,7 @@
           <p:cNvPr id="17" name="Straight Arrow Connector 16">
             <a:extLst>
               <a:ext uri="{FF2B5EF4-FFF2-40B4-BE49-F238E27FC236}">
-                <a16:creationId xmlns:a16="http://schemas.microsoft.com/office/drawing/2014/main" id="{06D0C054-4641-41CB-BFE8-B7AB0BDDF16A}"/>
+                <a16:creationId xmlns:a16="http://schemas.microsoft.com/office/drawing/2014/main" xmlns="" id="{06D0C054-4641-41CB-BFE8-B7AB0BDDF16A}"/>
               </a:ext>
             </a:extLst>
           </p:cNvPr>
@@ -12026,7 +11844,7 @@
           <p:cNvPr id="43" name="TextBox 42">
             <a:extLst>
               <a:ext uri="{FF2B5EF4-FFF2-40B4-BE49-F238E27FC236}">
-                <a16:creationId xmlns:a16="http://schemas.microsoft.com/office/drawing/2014/main" id="{D320C4C5-E07E-4A84-AE80-C72481A4DD71}"/>
+                <a16:creationId xmlns:a16="http://schemas.microsoft.com/office/drawing/2014/main" xmlns="" id="{D320C4C5-E07E-4A84-AE80-C72481A4DD71}"/>
               </a:ext>
             </a:extLst>
           </p:cNvPr>
@@ -12102,16 +11920,10 @@
           <a:p>
             <a:pPr algn="ctr"/>
             <a:r>
-              <a:rPr lang="en-US" dirty="0" err="1">
-                <a:cs typeface="Calibri"/>
-              </a:rPr>
-              <a:t>Accur</a:t>
-            </a:r>
-            <a:r>
               <a:rPr lang="en-US" dirty="0">
                 <a:cs typeface="Calibri"/>
               </a:rPr>
-              <a:t>. = </a:t>
+              <a:t>Accur. = </a:t>
             </a:r>
             <a:r>
               <a:rPr lang="en-US" dirty="0">
@@ -12131,7 +11943,7 @@
           <p:cNvPr id="18" name="TextBox 17">
             <a:extLst>
               <a:ext uri="{FF2B5EF4-FFF2-40B4-BE49-F238E27FC236}">
-                <a16:creationId xmlns:a16="http://schemas.microsoft.com/office/drawing/2014/main" id="{50E25149-87ED-44FD-9CF1-B9044D96655F}"/>
+                <a16:creationId xmlns:a16="http://schemas.microsoft.com/office/drawing/2014/main" xmlns="" id="{50E25149-87ED-44FD-9CF1-B9044D96655F}"/>
               </a:ext>
             </a:extLst>
           </p:cNvPr>
@@ -12158,22 +11970,10 @@
           <a:lstStyle/>
           <a:p>
             <a:r>
-              <a:rPr lang="en-US" dirty="0" err="1">
-                <a:cs typeface="Calibri"/>
-              </a:rPr>
-              <a:t>learning_rate</a:t>
-            </a:r>
-            <a:r>
               <a:rPr lang="en-US" dirty="0">
                 <a:cs typeface="Calibri"/>
               </a:rPr>
-              <a:t>, </a:t>
-            </a:r>
-            <a:r>
-              <a:rPr lang="en-US" dirty="0" err="1">
-                <a:cs typeface="Calibri"/>
-              </a:rPr>
-              <a:t>scale_pos_weight</a:t>
+              <a:t>learning_rate, scale_pos_weight</a:t>
             </a:r>
           </a:p>
         </p:txBody>
@@ -12183,7 +11983,7 @@
           <p:cNvPr id="22" name="Arrow: Curved Down 21">
             <a:extLst>
               <a:ext uri="{FF2B5EF4-FFF2-40B4-BE49-F238E27FC236}">
-                <a16:creationId xmlns:a16="http://schemas.microsoft.com/office/drawing/2014/main" id="{56BF9C2C-6A36-4AF8-8A1F-63E13DB402EB}"/>
+                <a16:creationId xmlns:a16="http://schemas.microsoft.com/office/drawing/2014/main" xmlns="" id="{56BF9C2C-6A36-4AF8-8A1F-63E13DB402EB}"/>
               </a:ext>
             </a:extLst>
           </p:cNvPr>
@@ -12225,7 +12025,7 @@
           <a:lstStyle/>
           <a:p>
             <a:pPr algn="ctr"/>
-            <a:endParaRPr lang="en-US">
+            <a:endParaRPr lang="en-US" dirty="0">
               <a:solidFill>
                 <a:schemeClr val="tx1"/>
               </a:solidFill>
@@ -12238,7 +12038,7 @@
           <p:cNvPr id="23" name="Straight Arrow Connector 22">
             <a:extLst>
               <a:ext uri="{FF2B5EF4-FFF2-40B4-BE49-F238E27FC236}">
-                <a16:creationId xmlns:a16="http://schemas.microsoft.com/office/drawing/2014/main" id="{5FA77980-240A-44F6-BE09-5D5B56E63B70}"/>
+                <a16:creationId xmlns:a16="http://schemas.microsoft.com/office/drawing/2014/main" xmlns="" id="{5FA77980-240A-44F6-BE09-5D5B56E63B70}"/>
               </a:ext>
             </a:extLst>
           </p:cNvPr>
@@ -12280,7 +12080,7 @@
           <p:cNvPr id="44" name="TextBox 43">
             <a:extLst>
               <a:ext uri="{FF2B5EF4-FFF2-40B4-BE49-F238E27FC236}">
-                <a16:creationId xmlns:a16="http://schemas.microsoft.com/office/drawing/2014/main" id="{A0B7E8B0-F52B-488F-8AC8-8EFD83ED424B}"/>
+                <a16:creationId xmlns:a16="http://schemas.microsoft.com/office/drawing/2014/main" xmlns="" id="{A0B7E8B0-F52B-488F-8AC8-8EFD83ED424B}"/>
               </a:ext>
             </a:extLst>
           </p:cNvPr>
@@ -12356,16 +12156,10 @@
           <a:p>
             <a:pPr algn="ctr"/>
             <a:r>
-              <a:rPr lang="en-US" dirty="0" err="1">
-                <a:cs typeface="Calibri"/>
-              </a:rPr>
-              <a:t>Accur</a:t>
-            </a:r>
-            <a:r>
               <a:rPr lang="en-US" dirty="0">
                 <a:cs typeface="Calibri"/>
               </a:rPr>
-              <a:t>. = </a:t>
+              <a:t>Accur. = </a:t>
             </a:r>
             <a:r>
               <a:rPr lang="en-US" dirty="0">
@@ -12385,7 +12179,7 @@
           <p:cNvPr id="24" name="TextBox 23">
             <a:extLst>
               <a:ext uri="{FF2B5EF4-FFF2-40B4-BE49-F238E27FC236}">
-                <a16:creationId xmlns:a16="http://schemas.microsoft.com/office/drawing/2014/main" id="{E163B569-B72D-4CB2-ABFA-80194E6829FC}"/>
+                <a16:creationId xmlns:a16="http://schemas.microsoft.com/office/drawing/2014/main" xmlns="" id="{E163B569-B72D-4CB2-ABFA-80194E6829FC}"/>
               </a:ext>
             </a:extLst>
           </p:cNvPr>
@@ -12413,7 +12207,7 @@
           <a:p>
             <a:pPr algn="l"/>
             <a:r>
-              <a:rPr lang="en-US" dirty="0" err="1"/>
+              <a:rPr lang="en-US" dirty="0"/>
               <a:t>n_estimators</a:t>
             </a:r>
           </a:p>
@@ -12424,7 +12218,7 @@
           <p:cNvPr id="19" name="Straight Arrow Connector 18">
             <a:extLst>
               <a:ext uri="{FF2B5EF4-FFF2-40B4-BE49-F238E27FC236}">
-                <a16:creationId xmlns:a16="http://schemas.microsoft.com/office/drawing/2014/main" id="{F3B3F972-78F1-4232-B503-C83042CF4E99}"/>
+                <a16:creationId xmlns:a16="http://schemas.microsoft.com/office/drawing/2014/main" xmlns="" id="{F3B3F972-78F1-4232-B503-C83042CF4E99}"/>
               </a:ext>
             </a:extLst>
           </p:cNvPr>
@@ -12466,7 +12260,7 @@
           <p:cNvPr id="45" name="TextBox 44">
             <a:extLst>
               <a:ext uri="{FF2B5EF4-FFF2-40B4-BE49-F238E27FC236}">
-                <a16:creationId xmlns:a16="http://schemas.microsoft.com/office/drawing/2014/main" id="{CBE6DF19-E8B4-49B7-A25C-A232E5FCED13}"/>
+                <a16:creationId xmlns:a16="http://schemas.microsoft.com/office/drawing/2014/main" xmlns="" id="{CBE6DF19-E8B4-49B7-A25C-A232E5FCED13}"/>
               </a:ext>
             </a:extLst>
           </p:cNvPr>
@@ -12542,16 +12336,10 @@
           <a:p>
             <a:pPr algn="ctr"/>
             <a:r>
-              <a:rPr lang="en-US" dirty="0" err="1">
-                <a:cs typeface="Calibri"/>
-              </a:rPr>
-              <a:t>Accur</a:t>
-            </a:r>
-            <a:r>
               <a:rPr lang="en-US" dirty="0">
                 <a:cs typeface="Calibri"/>
               </a:rPr>
-              <a:t>. = </a:t>
+              <a:t>Accur. = </a:t>
             </a:r>
             <a:r>
               <a:rPr lang="en-US" dirty="0">
@@ -12571,7 +12359,7 @@
           <p:cNvPr id="21" name="TextBox 20">
             <a:extLst>
               <a:ext uri="{FF2B5EF4-FFF2-40B4-BE49-F238E27FC236}">
-                <a16:creationId xmlns:a16="http://schemas.microsoft.com/office/drawing/2014/main" id="{CA7781F8-F1FE-4A85-9782-5BD5F971564C}"/>
+                <a16:creationId xmlns:a16="http://schemas.microsoft.com/office/drawing/2014/main" xmlns="" id="{CA7781F8-F1FE-4A85-9782-5BD5F971564C}"/>
               </a:ext>
             </a:extLst>
           </p:cNvPr>
@@ -12599,48 +12387,34 @@
           <a:p>
             <a:pPr algn="ctr"/>
             <a:r>
-              <a:rPr lang="en-US" dirty="0" err="1">
-                <a:ea typeface="+mn-lt"/>
-                <a:cs typeface="+mn-lt"/>
-              </a:rPr>
-              <a:t>learning_rate</a:t>
-            </a:r>
-            <a:r>
               <a:rPr lang="en-US" dirty="0">
                 <a:ea typeface="+mn-lt"/>
                 <a:cs typeface="+mn-lt"/>
               </a:rPr>
-              <a:t>,</a:t>
-            </a:r>
-            <a:endParaRPr lang="en-US"/>
+              <a:t>learning_rate,</a:t>
+            </a:r>
+            <a:endParaRPr lang="en-US" dirty="0"/>
           </a:p>
           <a:p>
             <a:pPr algn="ctr"/>
-            <a:r>
-              <a:rPr lang="en-US" dirty="0" err="1">
-                <a:ea typeface="+mn-lt"/>
-                <a:cs typeface="+mn-lt"/>
-              </a:rPr>
-              <a:t>max_depth</a:t>
-            </a:r>
             <a:r>
               <a:rPr lang="en-US" dirty="0">
                 <a:ea typeface="+mn-lt"/>
                 <a:cs typeface="+mn-lt"/>
               </a:rPr>
-              <a:t>,</a:t>
+              <a:t>max_depth,</a:t>
             </a:r>
           </a:p>
           <a:p>
             <a:pPr algn="ctr"/>
             <a:r>
-              <a:rPr lang="en-US" err="1">
+              <a:rPr lang="en-US" dirty="0">
                 <a:ea typeface="+mn-lt"/>
                 <a:cs typeface="+mn-lt"/>
               </a:rPr>
               <a:t>reg_alpha</a:t>
             </a:r>
-            <a:endParaRPr lang="en-US" err="1">
+            <a:endParaRPr lang="en-US" dirty="0">
               <a:cs typeface="Calibri"/>
             </a:endParaRPr>
           </a:p>
@@ -12651,7 +12425,7 @@
           <p:cNvPr id="27" name="Straight Arrow Connector 26">
             <a:extLst>
               <a:ext uri="{FF2B5EF4-FFF2-40B4-BE49-F238E27FC236}">
-                <a16:creationId xmlns:a16="http://schemas.microsoft.com/office/drawing/2014/main" id="{9C6C2A8D-7126-451E-9FB9-1D403A137C3B}"/>
+                <a16:creationId xmlns:a16="http://schemas.microsoft.com/office/drawing/2014/main" xmlns="" id="{9C6C2A8D-7126-451E-9FB9-1D403A137C3B}"/>
               </a:ext>
             </a:extLst>
           </p:cNvPr>
@@ -12693,7 +12467,7 @@
           <p:cNvPr id="46" name="TextBox 45">
             <a:extLst>
               <a:ext uri="{FF2B5EF4-FFF2-40B4-BE49-F238E27FC236}">
-                <a16:creationId xmlns:a16="http://schemas.microsoft.com/office/drawing/2014/main" id="{E5621ADE-4EA1-4D1A-9A2C-B40BA4F056FD}"/>
+                <a16:creationId xmlns:a16="http://schemas.microsoft.com/office/drawing/2014/main" xmlns="" id="{E5621ADE-4EA1-4D1A-9A2C-B40BA4F056FD}"/>
               </a:ext>
             </a:extLst>
           </p:cNvPr>
@@ -12769,16 +12543,10 @@
           <a:p>
             <a:pPr algn="ctr"/>
             <a:r>
-              <a:rPr lang="en-US" dirty="0" err="1">
-                <a:cs typeface="Calibri"/>
-              </a:rPr>
-              <a:t>Accur</a:t>
-            </a:r>
-            <a:r>
               <a:rPr lang="en-US" dirty="0">
                 <a:cs typeface="Calibri"/>
               </a:rPr>
-              <a:t>. = </a:t>
+              <a:t>Accur. = </a:t>
             </a:r>
             <a:r>
               <a:rPr lang="en-US" dirty="0">
@@ -12798,7 +12566,7 @@
           <p:cNvPr id="47" name="TextBox 46">
             <a:extLst>
               <a:ext uri="{FF2B5EF4-FFF2-40B4-BE49-F238E27FC236}">
-                <a16:creationId xmlns:a16="http://schemas.microsoft.com/office/drawing/2014/main" id="{1FE17872-5983-42F4-B08C-CE25FAF6B0D0}"/>
+                <a16:creationId xmlns:a16="http://schemas.microsoft.com/office/drawing/2014/main" xmlns="" id="{1FE17872-5983-42F4-B08C-CE25FAF6B0D0}"/>
               </a:ext>
             </a:extLst>
           </p:cNvPr>
@@ -12825,7 +12593,7 @@
           <a:lstStyle/>
           <a:p>
             <a:r>
-              <a:rPr lang="en-US" dirty="0" err="1">
+              <a:rPr lang="en-US" dirty="0">
                 <a:cs typeface="Calibri"/>
               </a:rPr>
               <a:t>n_estimators</a:t>
@@ -12833,6 +12601,42 @@
           </a:p>
         </p:txBody>
       </p:sp>
+      <p:cxnSp>
+        <p:nvCxnSpPr>
+          <p:cNvPr id="49" name="Straight Arrow Connector 48"/>
+          <p:cNvCxnSpPr/>
+          <p:nvPr/>
+        </p:nvCxnSpPr>
+        <p:spPr>
+          <a:xfrm>
+            <a:off x="2162828" y="6477000"/>
+            <a:ext cx="504172" cy="303665"/>
+          </a:xfrm>
+          <a:prstGeom prst="straightConnector1">
+            <a:avLst/>
+          </a:prstGeom>
+          <a:ln w="28575" cmpd="sng">
+            <a:solidFill>
+              <a:schemeClr val="tx1"/>
+            </a:solidFill>
+            <a:tailEnd type="arrow"/>
+          </a:ln>
+        </p:spPr>
+        <p:style>
+          <a:lnRef idx="1">
+            <a:schemeClr val="accent1"/>
+          </a:lnRef>
+          <a:fillRef idx="0">
+            <a:schemeClr val="accent1"/>
+          </a:fillRef>
+          <a:effectRef idx="0">
+            <a:schemeClr val="accent1"/>
+          </a:effectRef>
+          <a:fontRef idx="minor">
+            <a:schemeClr val="tx1"/>
+          </a:fontRef>
+        </p:style>
+      </p:cxnSp>
     </p:spTree>
     <p:extLst>
       <p:ext uri="{BB962C8B-B14F-4D97-AF65-F5344CB8AC3E}">
@@ -12914,7 +12718,7 @@
           <p:cNvPr id="6" name="Table 6">
             <a:extLst>
               <a:ext uri="{FF2B5EF4-FFF2-40B4-BE49-F238E27FC236}">
-                <a16:creationId xmlns:a16="http://schemas.microsoft.com/office/drawing/2014/main" id="{284D2DEA-B44E-4F38-905D-31C238B27232}"/>
+                <a16:creationId xmlns:a16="http://schemas.microsoft.com/office/drawing/2014/main" xmlns="" id="{284D2DEA-B44E-4F38-905D-31C238B27232}"/>
               </a:ext>
             </a:extLst>
           </p:cNvPr>
@@ -12924,14 +12728,14 @@
           <p:nvPr>
             <p:extLst>
               <p:ext uri="{D42A27DB-BD31-4B8C-83A1-F6EECF244321}">
-                <p14:modId xmlns:p14="http://schemas.microsoft.com/office/powerpoint/2010/main" val="2489023254"/>
+                <p14:modId xmlns:p14="http://schemas.microsoft.com/office/powerpoint/2010/main" val="979815306"/>
               </p:ext>
             </p:extLst>
           </p:nvPr>
         </p:nvGraphicFramePr>
         <p:xfrm>
           <a:off x="340770" y="880322"/>
-          <a:ext cx="8661172" cy="5146039"/>
+          <a:ext cx="8661172" cy="4602479"/>
         </p:xfrm>
         <a:graphic>
           <a:graphicData uri="http://schemas.openxmlformats.org/drawingml/2006/table">
@@ -12943,56 +12747,56 @@
                 <a:gridCol w="1434074">
                   <a:extLst>
                     <a:ext uri="{9D8B030D-6E8A-4147-A177-3AD203B41FA5}">
-                      <a16:colId xmlns:a16="http://schemas.microsoft.com/office/drawing/2014/main" val="4146335704"/>
+                      <a16:colId xmlns:a16="http://schemas.microsoft.com/office/drawing/2014/main" xmlns="" val="4146335704"/>
                     </a:ext>
                   </a:extLst>
                 </a:gridCol>
                 <a:gridCol w="1036509">
                   <a:extLst>
                     <a:ext uri="{9D8B030D-6E8A-4147-A177-3AD203B41FA5}">
-                      <a16:colId xmlns:a16="http://schemas.microsoft.com/office/drawing/2014/main" val="2701913253"/>
+                      <a16:colId xmlns:a16="http://schemas.microsoft.com/office/drawing/2014/main" xmlns="" val="2701913253"/>
                     </a:ext>
                   </a:extLst>
                 </a:gridCol>
                 <a:gridCol w="1008111">
                   <a:extLst>
                     <a:ext uri="{9D8B030D-6E8A-4147-A177-3AD203B41FA5}">
-                      <a16:colId xmlns:a16="http://schemas.microsoft.com/office/drawing/2014/main" val="1743288694"/>
+                      <a16:colId xmlns:a16="http://schemas.microsoft.com/office/drawing/2014/main" xmlns="" val="1743288694"/>
                     </a:ext>
                   </a:extLst>
                 </a:gridCol>
                 <a:gridCol w="567948">
                   <a:extLst>
                     <a:ext uri="{9D8B030D-6E8A-4147-A177-3AD203B41FA5}">
-                      <a16:colId xmlns:a16="http://schemas.microsoft.com/office/drawing/2014/main" val="1517232168"/>
+                      <a16:colId xmlns:a16="http://schemas.microsoft.com/office/drawing/2014/main" xmlns="" val="1517232168"/>
                     </a:ext>
                   </a:extLst>
                 </a:gridCol>
-                <a:gridCol w="1334683">
+                <a:gridCol w="1479988">
                   <a:extLst>
                     <a:ext uri="{9D8B030D-6E8A-4147-A177-3AD203B41FA5}">
-                      <a16:colId xmlns:a16="http://schemas.microsoft.com/office/drawing/2014/main" val="421611148"/>
+                      <a16:colId xmlns:a16="http://schemas.microsoft.com/office/drawing/2014/main" xmlns="" val="421611148"/>
                     </a:ext>
                   </a:extLst>
                 </a:gridCol>
-                <a:gridCol w="738324">
+                <a:gridCol w="609600">
                   <a:extLst>
                     <a:ext uri="{9D8B030D-6E8A-4147-A177-3AD203B41FA5}">
-                      <a16:colId xmlns:a16="http://schemas.microsoft.com/office/drawing/2014/main" val="1800405269"/>
+                      <a16:colId xmlns:a16="http://schemas.microsoft.com/office/drawing/2014/main" xmlns="" val="1800405269"/>
                     </a:ext>
                   </a:extLst>
                 </a:gridCol>
-                <a:gridCol w="1434074">
+                <a:gridCol w="1524000">
                   <a:extLst>
                     <a:ext uri="{9D8B030D-6E8A-4147-A177-3AD203B41FA5}">
-                      <a16:colId xmlns:a16="http://schemas.microsoft.com/office/drawing/2014/main" val="1198058030"/>
+                      <a16:colId xmlns:a16="http://schemas.microsoft.com/office/drawing/2014/main" xmlns="" val="1198058030"/>
                     </a:ext>
                   </a:extLst>
                 </a:gridCol>
-                <a:gridCol w="1107449">
+                <a:gridCol w="1000942">
                   <a:extLst>
                     <a:ext uri="{9D8B030D-6E8A-4147-A177-3AD203B41FA5}">
-                      <a16:colId xmlns:a16="http://schemas.microsoft.com/office/drawing/2014/main" val="1408890717"/>
+                      <a16:colId xmlns:a16="http://schemas.microsoft.com/office/drawing/2014/main" xmlns="" val="1408890717"/>
                     </a:ext>
                   </a:extLst>
                 </a:gridCol>
@@ -13102,7 +12906,7 @@
                 </a:tc>
                 <a:extLst>
                   <a:ext uri="{0D108BD9-81ED-4DB2-BD59-A6C34878D82A}">
-                    <a16:rowId xmlns:a16="http://schemas.microsoft.com/office/drawing/2014/main" val="3318604622"/>
+                    <a16:rowId xmlns:a16="http://schemas.microsoft.com/office/drawing/2014/main" xmlns="" val="3318604622"/>
                   </a:ext>
                 </a:extLst>
               </a:tr>
@@ -13119,7 +12923,7 @@
                         <a:rPr lang="en-US" b="1" dirty="0"/>
                         <a:t>AUC</a:t>
                       </a:r>
-                      <a:endParaRPr lang="en-US"/>
+                      <a:endParaRPr lang="en-US" dirty="0"/>
                     </a:p>
                   </a:txBody>
                   <a:tcPr/>
@@ -13136,7 +12940,6 @@
                         <a:rPr lang="en-US" dirty="0"/>
                         <a:t>.846531</a:t>
                       </a:r>
-                      <a:endParaRPr lang="en-US"/>
                     </a:p>
                   </a:txBody>
                   <a:tcPr/>
@@ -13155,7 +12958,7 @@
                         </a:rPr>
                         <a:t>.696687</a:t>
                       </a:r>
-                      <a:endParaRPr lang="en-US" b="0"/>
+                      <a:endParaRPr lang="en-US" b="0" dirty="0"/>
                     </a:p>
                   </a:txBody>
                   <a:tcPr/>
@@ -13208,8 +13011,16 @@
                         <a:buNone/>
                       </a:pPr>
                       <a:r>
-                        <a:rPr lang="en-US" sz="1800" b="0" i="0" u="none" strike="noStrike" noProof="0" dirty="0"/>
-                        <a:t>0.876461</a:t>
+                        <a:rPr lang="en-US" sz="1800" kern="1200" dirty="0" smtClean="0">
+                          <a:solidFill>
+                            <a:schemeClr val="dk1"/>
+                          </a:solidFill>
+                          <a:effectLst/>
+                          <a:latin typeface="+mn-lt"/>
+                          <a:ea typeface="+mn-ea"/>
+                          <a:cs typeface="+mn-cs"/>
+                        </a:rPr>
+                        <a:t>0.878893</a:t>
                       </a:r>
                       <a:endParaRPr lang="en-US" sz="1800" b="0" i="0" u="none" strike="noStrike" noProof="0" dirty="0">
                         <a:latin typeface="Calibri"/>
@@ -13230,7 +13041,7 @@
                 </a:tc>
                 <a:extLst>
                   <a:ext uri="{0D108BD9-81ED-4DB2-BD59-A6C34878D82A}">
-                    <a16:rowId xmlns:a16="http://schemas.microsoft.com/office/drawing/2014/main" val="2750708460"/>
+                    <a16:rowId xmlns:a16="http://schemas.microsoft.com/office/drawing/2014/main" xmlns="" val="2750708460"/>
                   </a:ext>
                 </a:extLst>
               </a:tr>
@@ -13247,7 +13058,7 @@
                         <a:rPr lang="en-US" b="0" dirty="0"/>
                         <a:t>Accuracy</a:t>
                       </a:r>
-                      <a:endParaRPr lang="en-US"/>
+                      <a:endParaRPr lang="en-US" dirty="0"/>
                     </a:p>
                   </a:txBody>
                   <a:tcPr/>
@@ -13283,7 +13094,7 @@
                         <a:rPr lang="en-US" sz="1800" b="0" i="0" u="none" strike="noStrike" noProof="0" dirty="0"/>
                         <a:t>.905800</a:t>
                       </a:r>
-                      <a:endParaRPr lang="en-US"/>
+                      <a:endParaRPr lang="en-US" dirty="0"/>
                     </a:p>
                   </a:txBody>
                   <a:tcPr/>
@@ -13336,8 +13147,16 @@
                         <a:buNone/>
                       </a:pPr>
                       <a:r>
-                        <a:rPr lang="en-US" sz="1800" b="0" i="0" u="none" strike="noStrike" noProof="0" dirty="0"/>
-                        <a:t>0.931491</a:t>
+                        <a:rPr lang="en-US" sz="1800" kern="1200" dirty="0" smtClean="0">
+                          <a:solidFill>
+                            <a:schemeClr val="dk1"/>
+                          </a:solidFill>
+                          <a:effectLst/>
+                          <a:latin typeface="+mn-lt"/>
+                          <a:ea typeface="+mn-ea"/>
+                          <a:cs typeface="+mn-cs"/>
+                        </a:rPr>
+                        <a:t>0.934800</a:t>
                       </a:r>
                       <a:endParaRPr lang="en-US" dirty="0"/>
                     </a:p>
@@ -13356,7 +13175,7 @@
                 </a:tc>
                 <a:extLst>
                   <a:ext uri="{0D108BD9-81ED-4DB2-BD59-A6C34878D82A}">
-                    <a16:rowId xmlns:a16="http://schemas.microsoft.com/office/drawing/2014/main" val="60869610"/>
+                    <a16:rowId xmlns:a16="http://schemas.microsoft.com/office/drawing/2014/main" xmlns="" val="60869610"/>
                   </a:ext>
                 </a:extLst>
               </a:tr>
@@ -13482,7 +13301,7 @@
                 </a:tc>
                 <a:extLst>
                   <a:ext uri="{0D108BD9-81ED-4DB2-BD59-A6C34878D82A}">
-                    <a16:rowId xmlns:a16="http://schemas.microsoft.com/office/drawing/2014/main" val="3638464236"/>
+                    <a16:rowId xmlns:a16="http://schemas.microsoft.com/office/drawing/2014/main" xmlns="" val="3638464236"/>
                   </a:ext>
                 </a:extLst>
               </a:tr>
@@ -13630,7 +13449,7 @@
                 </a:tc>
                 <a:extLst>
                   <a:ext uri="{0D108BD9-81ED-4DB2-BD59-A6C34878D82A}">
-                    <a16:rowId xmlns:a16="http://schemas.microsoft.com/office/drawing/2014/main" val="4042861482"/>
+                    <a16:rowId xmlns:a16="http://schemas.microsoft.com/office/drawing/2014/main" xmlns="" val="4042861482"/>
                   </a:ext>
                 </a:extLst>
               </a:tr>
@@ -13647,7 +13466,6 @@
                         <a:rPr lang="en-US" dirty="0"/>
                         <a:t>max_iter</a:t>
                       </a:r>
-                      <a:endParaRPr lang="en-US"/>
                     </a:p>
                   </a:txBody>
                   <a:tcPr/>
@@ -13664,7 +13482,6 @@
                         <a:rPr lang="en-US" dirty="0"/>
                         <a:t>1450</a:t>
                       </a:r>
-                      <a:endParaRPr lang="en-US"/>
                     </a:p>
                   </a:txBody>
                   <a:tcPr/>
@@ -13701,21 +13518,10 @@
                         <a:buNone/>
                       </a:pPr>
                       <a:r>
-                        <a:rPr lang="en-US" sz="1800" b="0" i="0" u="none" strike="noStrike" noProof="0" dirty="0">
+                        <a:rPr lang="en-US" sz="1800" b="0" i="0" u="none" strike="noStrike" noProof="0" dirty="0" smtClean="0">
                           <a:latin typeface="Calibri"/>
                         </a:rPr>
-                        <a:t>max_</a:t>
-                      </a:r>
-                      <a:br>
-                        <a:rPr lang="en-US" sz="1800" b="0" i="0" u="none" strike="noStrike" noProof="0" dirty="0">
-                          <a:latin typeface="Calibri"/>
-                        </a:rPr>
-                      </a:br>
-                      <a:r>
-                        <a:rPr lang="en-US" sz="1800" b="0" i="0" u="none" strike="noStrike" noProof="0" dirty="0">
-                          <a:latin typeface="Calibri"/>
-                        </a:rPr>
-                        <a:t>features</a:t>
+                        <a:t>max_features</a:t>
                       </a:r>
                       <a:endParaRPr lang="en-US" b="0" dirty="0"/>
                     </a:p>
@@ -13766,10 +13572,10 @@
                         <a:buNone/>
                       </a:pPr>
                       <a:r>
-                        <a:rPr lang="en-US" sz="1800" b="0" i="0" u="none" strike="noStrike" noProof="0" dirty="0">
+                        <a:rPr lang="en-US" sz="1800" b="0" i="0" u="none" strike="noStrike" noProof="0" dirty="0" smtClean="0">
                           <a:latin typeface="Calibri"/>
                         </a:rPr>
-                        <a:t>0.039</a:t>
+                        <a:t>0.033</a:t>
                       </a:r>
                       <a:endParaRPr lang="en-US" dirty="0"/>
                     </a:p>
@@ -13778,7 +13584,7 @@
                 </a:tc>
                 <a:extLst>
                   <a:ext uri="{0D108BD9-81ED-4DB2-BD59-A6C34878D82A}">
-                    <a16:rowId xmlns:a16="http://schemas.microsoft.com/office/drawing/2014/main" val="2495835195"/>
+                    <a16:rowId xmlns:a16="http://schemas.microsoft.com/office/drawing/2014/main" xmlns="" val="2495835195"/>
                   </a:ext>
                 </a:extLst>
               </a:tr>
@@ -13795,7 +13601,6 @@
                         <a:rPr lang="en-US" dirty="0"/>
                         <a:t>C</a:t>
                       </a:r>
-                      <a:endParaRPr lang="en-US"/>
                     </a:p>
                   </a:txBody>
                   <a:tcPr/>
@@ -13814,7 +13619,7 @@
                         </a:rPr>
                         <a:t>2.6</a:t>
                       </a:r>
-                      <a:endParaRPr lang="en-US" b="0"/>
+                      <a:endParaRPr lang="en-US" b="0" dirty="0"/>
                     </a:p>
                   </a:txBody>
                   <a:tcPr/>
@@ -13879,12 +13684,28 @@
                     <a:bodyPr/>
                     <a:lstStyle/>
                     <a:p>
-                      <a:pPr lvl="0">
+                      <a:pPr marL="0" marR="0" lvl="0" indent="0" algn="l" defTabSz="914400" rtl="0" eaLnBrk="1" fontAlgn="auto" latinLnBrk="0" hangingPunct="1">
+                        <a:lnSpc>
+                          <a:spcPct val="100000"/>
+                        </a:lnSpc>
+                        <a:spcBef>
+                          <a:spcPts val="0"/>
+                        </a:spcBef>
+                        <a:spcAft>
+                          <a:spcPts val="0"/>
+                        </a:spcAft>
+                        <a:buClrTx/>
+                        <a:buSzTx/>
+                        <a:buFontTx/>
                         <a:buNone/>
+                        <a:tabLst/>
+                        <a:defRPr/>
                       </a:pPr>
                       <a:r>
-                        <a:rPr lang="en-US" dirty="0"/>
-                        <a:t>n_estimators</a:t>
+                        <a:rPr lang="en-US" sz="1800" b="0" i="0" u="none" strike="noStrike" noProof="0" dirty="0" smtClean="0">
+                          <a:latin typeface="+mn-lt"/>
+                        </a:rPr>
+                        <a:t>max_depth</a:t>
                       </a:r>
                     </a:p>
                   </a:txBody>
@@ -13895,12 +13716,26 @@
                     <a:bodyPr/>
                     <a:lstStyle/>
                     <a:p>
-                      <a:pPr lvl="0" algn="ctr">
+                      <a:pPr marL="0" marR="0" lvl="0" indent="0" algn="ctr" defTabSz="914400" rtl="0" eaLnBrk="1" fontAlgn="auto" latinLnBrk="0" hangingPunct="1">
+                        <a:lnSpc>
+                          <a:spcPct val="100000"/>
+                        </a:lnSpc>
+                        <a:spcBef>
+                          <a:spcPts val="0"/>
+                        </a:spcBef>
+                        <a:spcAft>
+                          <a:spcPts val="0"/>
+                        </a:spcAft>
+                        <a:buClrTx/>
+                        <a:buSzTx/>
+                        <a:buFontTx/>
                         <a:buNone/>
+                        <a:tabLst/>
+                        <a:defRPr/>
                       </a:pPr>
                       <a:r>
-                        <a:rPr lang="en-US" dirty="0"/>
-                        <a:t>220</a:t>
+                        <a:rPr lang="en-US" dirty="0" smtClean="0"/>
+                        <a:t>9</a:t>
                       </a:r>
                     </a:p>
                   </a:txBody>
@@ -13908,7 +13743,7 @@
                 </a:tc>
                 <a:extLst>
                   <a:ext uri="{0D108BD9-81ED-4DB2-BD59-A6C34878D82A}">
-                    <a16:rowId xmlns:a16="http://schemas.microsoft.com/office/drawing/2014/main" val="4084173820"/>
+                    <a16:rowId xmlns:a16="http://schemas.microsoft.com/office/drawing/2014/main" xmlns="" val="4084173820"/>
                   </a:ext>
                 </a:extLst>
               </a:tr>
@@ -13925,7 +13760,6 @@
                         <a:rPr lang="en-US" dirty="0"/>
                         <a:t>class_weight</a:t>
                       </a:r>
-                      <a:endParaRPr lang="en-US"/>
                     </a:p>
                   </a:txBody>
                   <a:tcPr/>
@@ -13942,7 +13776,6 @@
                         <a:rPr lang="en-US" dirty="0"/>
                         <a:t>11</a:t>
                       </a:r>
-                      <a:endParaRPr lang="en-US"/>
                     </a:p>
                   </a:txBody>
                   <a:tcPr/>
@@ -14011,10 +13844,8 @@
                         <a:buNone/>
                       </a:pPr>
                       <a:r>
-                        <a:rPr lang="en-US" sz="1800" b="0" i="0" u="none" strike="noStrike" noProof="0" dirty="0">
-                          <a:latin typeface="Calibri"/>
-                        </a:rPr>
-                        <a:t>max_depth</a:t>
+                        <a:rPr lang="en-US" dirty="0" smtClean="0"/>
+                        <a:t>n_estimators</a:t>
                       </a:r>
                       <a:endParaRPr lang="en-US" b="0" dirty="0"/>
                     </a:p>
@@ -14030,16 +13861,17 @@
                         <a:buNone/>
                       </a:pPr>
                       <a:r>
-                        <a:rPr lang="en-US" dirty="0"/>
-                        <a:t>6</a:t>
+                        <a:rPr lang="en-US" dirty="0" smtClean="0"/>
+                        <a:t>206</a:t>
                       </a:r>
+                      <a:endParaRPr lang="en-US" dirty="0"/>
                     </a:p>
                   </a:txBody>
                   <a:tcPr/>
                 </a:tc>
                 <a:extLst>
                   <a:ext uri="{0D108BD9-81ED-4DB2-BD59-A6C34878D82A}">
-                    <a16:rowId xmlns:a16="http://schemas.microsoft.com/office/drawing/2014/main" val="2295784985"/>
+                    <a16:rowId xmlns:a16="http://schemas.microsoft.com/office/drawing/2014/main" xmlns="" val="2295784985"/>
                   </a:ext>
                 </a:extLst>
               </a:tr>
@@ -14138,10 +13970,10 @@
                         <a:buNone/>
                       </a:pPr>
                       <a:r>
-                        <a:rPr lang="en-US" sz="1800" b="0" i="0" u="none" strike="noStrike" noProof="0" dirty="0">
+                        <a:rPr lang="en-US" sz="1800" b="0" i="0" u="none" strike="noStrike" noProof="0" dirty="0" smtClean="0">
                           <a:latin typeface="Calibri"/>
                         </a:rPr>
-                        <a:t>3.360</a:t>
+                        <a:t>3.356</a:t>
                       </a:r>
                       <a:endParaRPr lang="en-US" dirty="0"/>
                     </a:p>
@@ -14150,7 +13982,7 @@
                 </a:tc>
                 <a:extLst>
                   <a:ext uri="{0D108BD9-81ED-4DB2-BD59-A6C34878D82A}">
-                    <a16:rowId xmlns:a16="http://schemas.microsoft.com/office/drawing/2014/main" val="967766446"/>
+                    <a16:rowId xmlns:a16="http://schemas.microsoft.com/office/drawing/2014/main" xmlns="" val="967766446"/>
                   </a:ext>
                 </a:extLst>
               </a:tr>
@@ -14240,18 +14072,21 @@
                         <a:buNone/>
                       </a:pPr>
                       <a:r>
-                        <a:rPr lang="en-US" sz="1800" b="0" i="0" u="none" strike="noStrike" noProof="0" dirty="0">
+                        <a:rPr lang="en-US" sz="1800" b="0" i="0" u="none" strike="noStrike" noProof="0" dirty="0" smtClean="0">
                           <a:latin typeface="Calibri"/>
                         </a:rPr>
-                        <a:t>1</a:t>
+                        <a:t>0.707</a:t>
                       </a:r>
+                      <a:endParaRPr lang="en-US" sz="1800" b="0" i="0" u="none" strike="noStrike" noProof="0" dirty="0">
+                        <a:latin typeface="Calibri"/>
+                      </a:endParaRPr>
                     </a:p>
                   </a:txBody>
                   <a:tcPr/>
                 </a:tc>
                 <a:extLst>
                   <a:ext uri="{0D108BD9-81ED-4DB2-BD59-A6C34878D82A}">
-                    <a16:rowId xmlns:a16="http://schemas.microsoft.com/office/drawing/2014/main" val="1199292131"/>
+                    <a16:rowId xmlns:a16="http://schemas.microsoft.com/office/drawing/2014/main" xmlns="" val="1199292131"/>
                   </a:ext>
                 </a:extLst>
               </a:tr>
@@ -14355,18 +14190,21 @@
                         <a:buNone/>
                       </a:pPr>
                       <a:r>
-                        <a:rPr lang="en-US" sz="1800" b="0" i="0" u="none" strike="noStrike" noProof="0" dirty="0">
+                        <a:rPr lang="en-US" sz="1800" b="0" i="0" u="none" strike="noStrike" noProof="0" dirty="0" smtClean="0">
                           <a:latin typeface="Calibri"/>
                         </a:rPr>
-                        <a:t>1</a:t>
+                        <a:t>0.955</a:t>
                       </a:r>
+                      <a:endParaRPr lang="en-US" sz="1800" b="0" i="0" u="none" strike="noStrike" noProof="0" dirty="0">
+                        <a:latin typeface="Calibri"/>
+                      </a:endParaRPr>
                     </a:p>
                   </a:txBody>
                   <a:tcPr/>
                 </a:tc>
                 <a:extLst>
                   <a:ext uri="{0D108BD9-81ED-4DB2-BD59-A6C34878D82A}">
-                    <a16:rowId xmlns:a16="http://schemas.microsoft.com/office/drawing/2014/main" val="1659236108"/>
+                    <a16:rowId xmlns:a16="http://schemas.microsoft.com/office/drawing/2014/main" xmlns="" val="1659236108"/>
                   </a:ext>
                 </a:extLst>
               </a:tr>
@@ -14379,7 +14217,7 @@
           <p:cNvPr id="2" name="Subtitle 2">
             <a:extLst>
               <a:ext uri="{FF2B5EF4-FFF2-40B4-BE49-F238E27FC236}">
-                <a16:creationId xmlns:a16="http://schemas.microsoft.com/office/drawing/2014/main" id="{2358FD3B-7909-403B-927C-69725AA60B23}"/>
+                <a16:creationId xmlns:a16="http://schemas.microsoft.com/office/drawing/2014/main" xmlns="" id="{2358FD3B-7909-403B-927C-69725AA60B23}"/>
               </a:ext>
             </a:extLst>
           </p:cNvPr>
@@ -14578,7 +14416,7 @@
           <p:cNvPr id="3" name="Picture 4" descr="Chart&#10;&#10;Description automatically generated">
             <a:extLst>
               <a:ext uri="{FF2B5EF4-FFF2-40B4-BE49-F238E27FC236}">
-                <a16:creationId xmlns:a16="http://schemas.microsoft.com/office/drawing/2014/main" id="{EC00E2E6-41F4-4077-9DD6-1ED7180541B9}"/>
+                <a16:creationId xmlns:a16="http://schemas.microsoft.com/office/drawing/2014/main" xmlns="" id="{EC00E2E6-41F4-4077-9DD6-1ED7180541B9}"/>
               </a:ext>
             </a:extLst>
           </p:cNvPr>
@@ -14608,7 +14446,7 @@
           <p:cNvPr id="5" name="Picture 6" descr="Chart&#10;&#10;Description automatically generated">
             <a:extLst>
               <a:ext uri="{FF2B5EF4-FFF2-40B4-BE49-F238E27FC236}">
-                <a16:creationId xmlns:a16="http://schemas.microsoft.com/office/drawing/2014/main" id="{AB0C4C4C-0227-44A6-804F-6C42C16C60A5}"/>
+                <a16:creationId xmlns:a16="http://schemas.microsoft.com/office/drawing/2014/main" xmlns="" id="{AB0C4C4C-0227-44A6-804F-6C42C16C60A5}"/>
               </a:ext>
             </a:extLst>
           </p:cNvPr>
@@ -14638,7 +14476,7 @@
           <p:cNvPr id="7" name="Picture 8" descr="Chart, line chart&#10;&#10;Description automatically generated">
             <a:extLst>
               <a:ext uri="{FF2B5EF4-FFF2-40B4-BE49-F238E27FC236}">
-                <a16:creationId xmlns:a16="http://schemas.microsoft.com/office/drawing/2014/main" id="{8944CE22-6EBC-40DF-B5FC-6BBAF1D20900}"/>
+                <a16:creationId xmlns:a16="http://schemas.microsoft.com/office/drawing/2014/main" xmlns="" id="{8944CE22-6EBC-40DF-B5FC-6BBAF1D20900}"/>
               </a:ext>
             </a:extLst>
           </p:cNvPr>
@@ -14698,7 +14536,7 @@
           <p:cNvPr id="5" name="Picture 5" descr="Chart, box and whisker chart&#10;&#10;Description automatically generated">
             <a:extLst>
               <a:ext uri="{FF2B5EF4-FFF2-40B4-BE49-F238E27FC236}">
-                <a16:creationId xmlns:a16="http://schemas.microsoft.com/office/drawing/2014/main" id="{CDCC659D-EB73-4DC3-96E8-94ABAE64BE5F}"/>
+                <a16:creationId xmlns:a16="http://schemas.microsoft.com/office/drawing/2014/main" xmlns="" id="{CDCC659D-EB73-4DC3-96E8-94ABAE64BE5F}"/>
               </a:ext>
             </a:extLst>
           </p:cNvPr>
@@ -14728,7 +14566,7 @@
           <p:cNvPr id="7" name="Title 1">
             <a:extLst>
               <a:ext uri="{FF2B5EF4-FFF2-40B4-BE49-F238E27FC236}">
-                <a16:creationId xmlns:a16="http://schemas.microsoft.com/office/drawing/2014/main" id="{3AC73D80-1832-49B3-A069-7FBB421E884C}"/>
+                <a16:creationId xmlns:a16="http://schemas.microsoft.com/office/drawing/2014/main" xmlns="" id="{3AC73D80-1832-49B3-A069-7FBB421E884C}"/>
               </a:ext>
             </a:extLst>
           </p:cNvPr>
@@ -14780,7 +14618,7 @@
           <p:cNvPr id="9" name="Subtitle 2">
             <a:extLst>
               <a:ext uri="{FF2B5EF4-FFF2-40B4-BE49-F238E27FC236}">
-                <a16:creationId xmlns:a16="http://schemas.microsoft.com/office/drawing/2014/main" id="{F3208A78-0D8D-4999-8F55-2B66B16B6697}"/>
+                <a16:creationId xmlns:a16="http://schemas.microsoft.com/office/drawing/2014/main" xmlns="" id="{F3208A78-0D8D-4999-8F55-2B66B16B6697}"/>
               </a:ext>
             </a:extLst>
           </p:cNvPr>
@@ -14970,7 +14808,7 @@
               </a:rPr>
               <a:t>Best model: Random Forest</a:t>
             </a:r>
-            <a:endParaRPr lang="en-US" sz="2200" b="1">
+            <a:endParaRPr lang="en-US" sz="2200" b="1" dirty="0">
               <a:solidFill>
                 <a:schemeClr val="tx1"/>
               </a:solidFill>
@@ -14984,7 +14822,7 @@
           <p:cNvPr id="2" name="Table 2">
             <a:extLst>
               <a:ext uri="{FF2B5EF4-FFF2-40B4-BE49-F238E27FC236}">
-                <a16:creationId xmlns:a16="http://schemas.microsoft.com/office/drawing/2014/main" id="{BD50AD44-1C7F-488F-9DB0-144E19BE1B09}"/>
+                <a16:creationId xmlns:a16="http://schemas.microsoft.com/office/drawing/2014/main" xmlns="" id="{BD50AD44-1C7F-488F-9DB0-144E19BE1B09}"/>
               </a:ext>
             </a:extLst>
           </p:cNvPr>
@@ -15013,49 +14851,49 @@
                 <a:gridCol w="1803242">
                   <a:extLst>
                     <a:ext uri="{9D8B030D-6E8A-4147-A177-3AD203B41FA5}">
-                      <a16:colId xmlns:a16="http://schemas.microsoft.com/office/drawing/2014/main" val="2935544924"/>
+                      <a16:colId xmlns:a16="http://schemas.microsoft.com/office/drawing/2014/main" xmlns="" val="2935544924"/>
                     </a:ext>
                   </a:extLst>
                 </a:gridCol>
                 <a:gridCol w="894519">
                   <a:extLst>
                     <a:ext uri="{9D8B030D-6E8A-4147-A177-3AD203B41FA5}">
-                      <a16:colId xmlns:a16="http://schemas.microsoft.com/office/drawing/2014/main" val="239053683"/>
+                      <a16:colId xmlns:a16="http://schemas.microsoft.com/office/drawing/2014/main" xmlns="" val="239053683"/>
                     </a:ext>
                   </a:extLst>
                 </a:gridCol>
                 <a:gridCol w="866123">
                   <a:extLst>
                     <a:ext uri="{9D8B030D-6E8A-4147-A177-3AD203B41FA5}">
-                      <a16:colId xmlns:a16="http://schemas.microsoft.com/office/drawing/2014/main" val="347678341"/>
+                      <a16:colId xmlns:a16="http://schemas.microsoft.com/office/drawing/2014/main" xmlns="" val="347678341"/>
                     </a:ext>
                   </a:extLst>
                 </a:gridCol>
                 <a:gridCol w="922916">
                   <a:extLst>
                     <a:ext uri="{9D8B030D-6E8A-4147-A177-3AD203B41FA5}">
-                      <a16:colId xmlns:a16="http://schemas.microsoft.com/office/drawing/2014/main" val="1379232212"/>
+                      <a16:colId xmlns:a16="http://schemas.microsoft.com/office/drawing/2014/main" xmlns="" val="1379232212"/>
                     </a:ext>
                   </a:extLst>
                 </a:gridCol>
                 <a:gridCol w="1008111">
                   <a:extLst>
                     <a:ext uri="{9D8B030D-6E8A-4147-A177-3AD203B41FA5}">
-                      <a16:colId xmlns:a16="http://schemas.microsoft.com/office/drawing/2014/main" val="3313033883"/>
+                      <a16:colId xmlns:a16="http://schemas.microsoft.com/office/drawing/2014/main" xmlns="" val="3313033883"/>
                     </a:ext>
                   </a:extLst>
                 </a:gridCol>
                 <a:gridCol w="908720">
                   <a:extLst>
                     <a:ext uri="{9D8B030D-6E8A-4147-A177-3AD203B41FA5}">
-                      <a16:colId xmlns:a16="http://schemas.microsoft.com/office/drawing/2014/main" val="528274519"/>
+                      <a16:colId xmlns:a16="http://schemas.microsoft.com/office/drawing/2014/main" xmlns="" val="528274519"/>
                     </a:ext>
                   </a:extLst>
                 </a:gridCol>
                 <a:gridCol w="894518">
                   <a:extLst>
                     <a:ext uri="{9D8B030D-6E8A-4147-A177-3AD203B41FA5}">
-                      <a16:colId xmlns:a16="http://schemas.microsoft.com/office/drawing/2014/main" val="1336929762"/>
+                      <a16:colId xmlns:a16="http://schemas.microsoft.com/office/drawing/2014/main" xmlns="" val="1336929762"/>
                     </a:ext>
                   </a:extLst>
                 </a:gridCol>
@@ -15237,7 +15075,7 @@
                 </a:tc>
                 <a:extLst>
                   <a:ext uri="{0D108BD9-81ED-4DB2-BD59-A6C34878D82A}">
-                    <a16:rowId xmlns:a16="http://schemas.microsoft.com/office/drawing/2014/main" val="1405367033"/>
+                    <a16:rowId xmlns:a16="http://schemas.microsoft.com/office/drawing/2014/main" xmlns="" val="1405367033"/>
                   </a:ext>
                 </a:extLst>
               </a:tr>
@@ -15248,7 +15086,7 @@
                     <a:lstStyle/>
                     <a:p>
                       <a:r>
-                        <a:rPr lang="en-US" sz="1600" b="1" dirty="0" err="1"/>
+                        <a:rPr lang="en-US" sz="1600" b="1" dirty="0"/>
                         <a:t>XGBoost</a:t>
                       </a:r>
                     </a:p>
@@ -15341,7 +15179,7 @@
                 </a:tc>
                 <a:extLst>
                   <a:ext uri="{0D108BD9-81ED-4DB2-BD59-A6C34878D82A}">
-                    <a16:rowId xmlns:a16="http://schemas.microsoft.com/office/drawing/2014/main" val="3132783388"/>
+                    <a16:rowId xmlns:a16="http://schemas.microsoft.com/office/drawing/2014/main" xmlns="" val="3132783388"/>
                   </a:ext>
                 </a:extLst>
               </a:tr>
@@ -15445,7 +15283,7 @@
                 </a:tc>
                 <a:extLst>
                   <a:ext uri="{0D108BD9-81ED-4DB2-BD59-A6C34878D82A}">
-                    <a16:rowId xmlns:a16="http://schemas.microsoft.com/office/drawing/2014/main" val="431170632"/>
+                    <a16:rowId xmlns:a16="http://schemas.microsoft.com/office/drawing/2014/main" xmlns="" val="431170632"/>
                   </a:ext>
                 </a:extLst>
               </a:tr>
@@ -15549,7 +15387,7 @@
                 </a:tc>
                 <a:extLst>
                   <a:ext uri="{0D108BD9-81ED-4DB2-BD59-A6C34878D82A}">
-                    <a16:rowId xmlns:a16="http://schemas.microsoft.com/office/drawing/2014/main" val="2299795005"/>
+                    <a16:rowId xmlns:a16="http://schemas.microsoft.com/office/drawing/2014/main" xmlns="" val="2299795005"/>
                   </a:ext>
                 </a:extLst>
               </a:tr>
@@ -15641,7 +15479,7 @@
                 </a:tc>
                 <a:extLst>
                   <a:ext uri="{0D108BD9-81ED-4DB2-BD59-A6C34878D82A}">
-                    <a16:rowId xmlns:a16="http://schemas.microsoft.com/office/drawing/2014/main" val="3675039423"/>
+                    <a16:rowId xmlns:a16="http://schemas.microsoft.com/office/drawing/2014/main" xmlns="" val="3675039423"/>
                   </a:ext>
                 </a:extLst>
               </a:tr>

</xml_diff>